<commit_message>
Added HOL Slides to Web Sites and Mobile Services
Added HOL slides to the Web Sites and Mobile Services decks.
</commit_message>
<xml_diff>
--- a/Presentations/03_Windows8AndWindowsAzureMobileServices.pptx
+++ b/Presentations/03_Windows8AndWindowsAzureMobileServices.pptx
@@ -5,10 +5,10 @@
     <p:sldMasterId id="2147484129" r:id="rId1"/>
   </p:sldMasterIdLst>
   <p:notesMasterIdLst>
-    <p:notesMasterId r:id="rId25"/>
+    <p:notesMasterId r:id="rId27"/>
   </p:notesMasterIdLst>
   <p:handoutMasterIdLst>
-    <p:handoutMasterId r:id="rId26"/>
+    <p:handoutMasterId r:id="rId28"/>
   </p:handoutMasterIdLst>
   <p:sldIdLst>
     <p:sldId id="508" r:id="rId2"/>
@@ -33,7 +33,9 @@
     <p:sldId id="545" r:id="rId21"/>
     <p:sldId id="567" r:id="rId22"/>
     <p:sldId id="563" r:id="rId23"/>
-    <p:sldId id="516" r:id="rId24"/>
+    <p:sldId id="569" r:id="rId24"/>
+    <p:sldId id="568" r:id="rId25"/>
+    <p:sldId id="516" r:id="rId26"/>
   </p:sldIdLst>
   <p:sldSz cx="12188825" cy="6858000"/>
   <p:notesSz cx="6858000" cy="9144000"/>
@@ -159,6 +161,8 @@
             <p14:sldId id="545"/>
             <p14:sldId id="567"/>
             <p14:sldId id="563"/>
+            <p14:sldId id="569"/>
+            <p14:sldId id="568"/>
             <p14:sldId id="516"/>
           </p14:sldIdLst>
         </p14:section>
@@ -5950,6 +5954,91 @@
     </p:spTree>
     <p:extLst>
       <p:ext uri="{BB962C8B-B14F-4D97-AF65-F5344CB8AC3E}">
+        <p14:creationId xmlns:p14="http://schemas.microsoft.com/office/powerpoint/2010/main" val="3959706789"/>
+      </p:ext>
+    </p:extLst>
+  </p:cSld>
+  <p:clrMapOvr>
+    <a:masterClrMapping/>
+  </p:clrMapOvr>
+</p:notes>
+</file>
+
+<file path=ppt/notesSlides/notesSlide24.xml><?xml version="1.0" encoding="utf-8"?>
+<p:notes xmlns:a="http://schemas.openxmlformats.org/drawingml/2006/main" xmlns:r="http://schemas.openxmlformats.org/officeDocument/2006/relationships" xmlns:p="http://schemas.openxmlformats.org/presentationml/2006/main">
+  <p:cSld>
+    <p:spTree>
+      <p:nvGrpSpPr>
+        <p:cNvPr id="1" name=""/>
+        <p:cNvGrpSpPr/>
+        <p:nvPr/>
+      </p:nvGrpSpPr>
+      <p:grpSpPr>
+        <a:xfrm>
+          <a:off x="0" y="0"/>
+          <a:ext cx="0" cy="0"/>
+          <a:chOff x="0" y="0"/>
+          <a:chExt cx="0" cy="0"/>
+        </a:xfrm>
+      </p:grpSpPr>
+      <p:sp>
+        <p:nvSpPr>
+          <p:cNvPr id="2" name="Slide Image Placeholder 1"/>
+          <p:cNvSpPr>
+            <a:spLocks noGrp="1" noRot="1" noChangeAspect="1"/>
+          </p:cNvSpPr>
+          <p:nvPr>
+            <p:ph type="sldImg"/>
+          </p:nvPr>
+        </p:nvSpPr>
+        <p:spPr/>
+      </p:sp>
+      <p:sp>
+        <p:nvSpPr>
+          <p:cNvPr id="3" name="Notes Placeholder 2"/>
+          <p:cNvSpPr>
+            <a:spLocks noGrp="1"/>
+          </p:cNvSpPr>
+          <p:nvPr>
+            <p:ph type="body" idx="1"/>
+          </p:nvPr>
+        </p:nvSpPr>
+        <p:spPr/>
+        <p:txBody>
+          <a:bodyPr/>
+          <a:lstStyle/>
+          <a:p>
+            <a:endParaRPr lang="en-US" dirty="0"/>
+          </a:p>
+        </p:txBody>
+      </p:sp>
+      <p:sp>
+        <p:nvSpPr>
+          <p:cNvPr id="4" name="Slide Number Placeholder 3"/>
+          <p:cNvSpPr>
+            <a:spLocks noGrp="1"/>
+          </p:cNvSpPr>
+          <p:nvPr>
+            <p:ph type="sldNum" sz="quarter" idx="10"/>
+          </p:nvPr>
+        </p:nvSpPr>
+        <p:spPr/>
+        <p:txBody>
+          <a:bodyPr/>
+          <a:lstStyle/>
+          <a:p>
+            <a:fld id="{8B263312-38AA-4E1E-B2B5-0F8F122B24FE}" type="slidenum">
+              <a:rPr lang="en-US" smtClean="0"/>
+              <a:pPr/>
+              <a:t>25</a:t>
+            </a:fld>
+            <a:endParaRPr lang="en-US" dirty="0"/>
+          </a:p>
+        </p:txBody>
+      </p:sp>
+    </p:spTree>
+    <p:extLst>
+      <p:ext uri="{BB962C8B-B14F-4D97-AF65-F5344CB8AC3E}">
         <p14:creationId xmlns:p14="http://schemas.microsoft.com/office/powerpoint/2010/main" val="2166615710"/>
       </p:ext>
     </p:extLst>
@@ -8607,7 +8696,7 @@
           <p:nvPr/>
         </p:nvPicPr>
         <mc:AlternateContent xmlns:mc="http://schemas.openxmlformats.org/markup-compatibility/2006">
-          <mc:Choice xmlns="" xmlns:mv="urn:schemas-microsoft-com:mac:vml" xmlns:ma="http://schemas.microsoft.com/office/mac/drawingml/2008/main" Requires="ma">
+          <mc:Choice xmlns:ma="http://schemas.microsoft.com/office/mac/drawingml/2008/main" xmlns:mv="urn:schemas-microsoft-com:mac:vml" xmlns="" Requires="ma">
             <p:blipFill>
               <a:blip r:embed="rId3"/>
               <a:srcRect l="19002" t="43683" r="16409" b="45008"/>
@@ -8677,11 +8766,11 @@
   <p:clrMapOvr>
     <a:masterClrMapping/>
   </p:clrMapOvr>
-  <mc:AlternateContent xmlns:mc="http://schemas.openxmlformats.org/markup-compatibility/2006">
-    <mc:Choice xmlns:p14="http://schemas.microsoft.com/office/powerpoint/2010/main" Requires="p14">
+  <mc:AlternateContent xmlns:mc="http://schemas.openxmlformats.org/markup-compatibility/2006" xmlns:p14="http://schemas.microsoft.com/office/powerpoint/2010/main">
+    <mc:Choice Requires="p14">
       <p:transition p14:dur="0"/>
     </mc:Choice>
-    <mc:Fallback>
+    <mc:Fallback xmlns="">
       <p:transition/>
     </mc:Fallback>
   </mc:AlternateContent>
@@ -9302,7 +9391,7 @@
           <p:nvPr/>
         </p:nvPicPr>
         <mc:AlternateContent xmlns:mc="http://schemas.openxmlformats.org/markup-compatibility/2006">
-          <mc:Choice xmlns="" xmlns:mv="urn:schemas-microsoft-com:mac:vml" xmlns:ma="http://schemas.microsoft.com/office/mac/drawingml/2008/main" Requires="ma">
+          <mc:Choice xmlns:ma="http://schemas.microsoft.com/office/mac/drawingml/2008/main" xmlns:mv="urn:schemas-microsoft-com:mac:vml" xmlns="" Requires="ma">
             <p:blipFill>
               <a:blip r:embed="rId11"/>
               <a:stretch>
@@ -9362,11 +9451,11 @@
   <p:clrMapOvr>
     <a:masterClrMapping/>
   </p:clrMapOvr>
-  <mc:AlternateContent xmlns:mc="http://schemas.openxmlformats.org/markup-compatibility/2006">
-    <mc:Choice xmlns:p14="http://schemas.microsoft.com/office/powerpoint/2010/main" Requires="p14">
+  <mc:AlternateContent xmlns:mc="http://schemas.openxmlformats.org/markup-compatibility/2006" xmlns:p14="http://schemas.microsoft.com/office/powerpoint/2010/main">
+    <mc:Choice Requires="p14">
       <p:transition p14:dur="0"/>
     </mc:Choice>
-    <mc:Fallback>
+    <mc:Fallback xmlns="">
       <p:transition/>
     </mc:Fallback>
   </mc:AlternateContent>
@@ -10875,7 +10964,7 @@
           <p:nvPr/>
         </p:nvPicPr>
         <mc:AlternateContent xmlns:mc="http://schemas.openxmlformats.org/markup-compatibility/2006">
-          <mc:Choice xmlns="" xmlns:mv="urn:schemas-microsoft-com:mac:vml" xmlns:ma="http://schemas.microsoft.com/office/mac/drawingml/2008/main" Requires="ma">
+          <mc:Choice xmlns:ma="http://schemas.microsoft.com/office/mac/drawingml/2008/main" xmlns:mv="urn:schemas-microsoft-com:mac:vml" xmlns="" Requires="ma">
             <p:blipFill>
               <a:blip r:embed="rId11"/>
               <a:stretch>
@@ -10946,11 +11035,11 @@
   <p:clrMapOvr>
     <a:masterClrMapping/>
   </p:clrMapOvr>
-  <mc:AlternateContent xmlns:mc="http://schemas.openxmlformats.org/markup-compatibility/2006">
-    <mc:Choice xmlns:p14="http://schemas.microsoft.com/office/powerpoint/2010/main" Requires="p14">
+  <mc:AlternateContent xmlns:mc="http://schemas.openxmlformats.org/markup-compatibility/2006" xmlns:p14="http://schemas.microsoft.com/office/powerpoint/2010/main">
+    <mc:Choice Requires="p14">
       <p:transition p14:dur="0"/>
     </mc:Choice>
-    <mc:Fallback>
+    <mc:Fallback xmlns="">
       <p:transition/>
     </mc:Fallback>
   </mc:AlternateContent>
@@ -10990,7 +11079,7 @@
           <p:nvPr/>
         </p:nvPicPr>
         <mc:AlternateContent xmlns:mc="http://schemas.openxmlformats.org/markup-compatibility/2006">
-          <mc:Choice xmlns="" xmlns:mv="urn:schemas-microsoft-com:mac:vml" xmlns:ma="http://schemas.microsoft.com/office/mac/drawingml/2008/main" Requires="ma">
+          <mc:Choice xmlns:ma="http://schemas.microsoft.com/office/mac/drawingml/2008/main" xmlns:mv="urn:schemas-microsoft-com:mac:vml" xmlns="" Requires="ma">
             <p:blipFill>
               <a:blip r:embed="rId11"/>
               <a:stretch>
@@ -11027,11 +11116,11 @@
   <p:clrMapOvr>
     <a:masterClrMapping/>
   </p:clrMapOvr>
-  <mc:AlternateContent xmlns:mc="http://schemas.openxmlformats.org/markup-compatibility/2006">
-    <mc:Choice xmlns:p14="http://schemas.microsoft.com/office/powerpoint/2010/main" Requires="p14">
+  <mc:AlternateContent xmlns:mc="http://schemas.openxmlformats.org/markup-compatibility/2006" xmlns:p14="http://schemas.microsoft.com/office/powerpoint/2010/main">
+    <mc:Choice Requires="p14">
       <p:transition p14:dur="0"/>
     </mc:Choice>
-    <mc:Fallback>
+    <mc:Fallback xmlns="">
       <p:transition/>
     </mc:Fallback>
   </mc:AlternateContent>
@@ -11072,11 +11161,11 @@
   <p:clrMapOvr>
     <a:masterClrMapping/>
   </p:clrMapOvr>
-  <mc:AlternateContent xmlns:mc="http://schemas.openxmlformats.org/markup-compatibility/2006">
-    <mc:Choice xmlns:p14="http://schemas.microsoft.com/office/powerpoint/2010/main" Requires="p14">
+  <mc:AlternateContent xmlns:mc="http://schemas.openxmlformats.org/markup-compatibility/2006" xmlns:p14="http://schemas.microsoft.com/office/powerpoint/2010/main">
+    <mc:Choice Requires="p14">
       <p:transition p14:dur="0"/>
     </mc:Choice>
-    <mc:Fallback>
+    <mc:Fallback xmlns="">
       <p:transition/>
     </mc:Fallback>
   </mc:AlternateContent>
@@ -11116,7 +11205,7 @@
           <p:nvPr/>
         </p:nvPicPr>
         <mc:AlternateContent xmlns:mc="http://schemas.openxmlformats.org/markup-compatibility/2006">
-          <mc:Choice xmlns="" xmlns:mv="urn:schemas-microsoft-com:mac:vml" xmlns:ma="http://schemas.microsoft.com/office/mac/drawingml/2008/main" Requires="ma">
+          <mc:Choice xmlns:ma="http://schemas.microsoft.com/office/mac/drawingml/2008/main" xmlns:mv="urn:schemas-microsoft-com:mac:vml" xmlns="" Requires="ma">
             <p:blipFill>
               <a:blip r:embed="rId11"/>
               <a:stretch>
@@ -11202,11 +11291,11 @@
   <p:clrMapOvr>
     <a:masterClrMapping/>
   </p:clrMapOvr>
-  <mc:AlternateContent xmlns:mc="http://schemas.openxmlformats.org/markup-compatibility/2006">
-    <mc:Choice xmlns:p14="http://schemas.microsoft.com/office/powerpoint/2010/main" Requires="p14">
+  <mc:AlternateContent xmlns:mc="http://schemas.openxmlformats.org/markup-compatibility/2006" xmlns:p14="http://schemas.microsoft.com/office/powerpoint/2010/main">
+    <mc:Choice Requires="p14">
       <p:transition p14:dur="0"/>
     </mc:Choice>
-    <mc:Fallback>
+    <mc:Fallback xmlns="">
       <p:transition/>
     </mc:Fallback>
   </mc:AlternateContent>
@@ -11247,11 +11336,11 @@
   <p:clrMapOvr>
     <a:masterClrMapping/>
   </p:clrMapOvr>
-  <mc:AlternateContent xmlns:mc="http://schemas.openxmlformats.org/markup-compatibility/2006">
-    <mc:Choice xmlns:p14="http://schemas.microsoft.com/office/powerpoint/2010/main" Requires="p14">
+  <mc:AlternateContent xmlns:mc="http://schemas.openxmlformats.org/markup-compatibility/2006" xmlns:p14="http://schemas.microsoft.com/office/powerpoint/2010/main">
+    <mc:Choice Requires="p14">
       <p:transition p14:dur="0"/>
     </mc:Choice>
-    <mc:Fallback>
+    <mc:Fallback xmlns="">
       <p:transition/>
     </mc:Fallback>
   </mc:AlternateContent>
@@ -11291,7 +11380,7 @@
           <p:nvPr/>
         </p:nvPicPr>
         <mc:AlternateContent xmlns:mc="http://schemas.openxmlformats.org/markup-compatibility/2006">
-          <mc:Choice xmlns="" xmlns:mv="urn:schemas-microsoft-com:mac:vml" xmlns:ma="http://schemas.microsoft.com/office/mac/drawingml/2008/main" Requires="ma">
+          <mc:Choice xmlns:ma="http://schemas.microsoft.com/office/mac/drawingml/2008/main" xmlns:mv="urn:schemas-microsoft-com:mac:vml" xmlns="" Requires="ma">
             <p:blipFill>
               <a:blip r:embed="rId11"/>
               <a:stretch>
@@ -11450,11 +11539,11 @@
   <p:clrMapOvr>
     <a:masterClrMapping/>
   </p:clrMapOvr>
-  <mc:AlternateContent xmlns:mc="http://schemas.openxmlformats.org/markup-compatibility/2006">
-    <mc:Choice xmlns:p14="http://schemas.microsoft.com/office/powerpoint/2010/main" Requires="p14">
+  <mc:AlternateContent xmlns:mc="http://schemas.openxmlformats.org/markup-compatibility/2006" xmlns:p14="http://schemas.microsoft.com/office/powerpoint/2010/main">
+    <mc:Choice Requires="p14">
       <p:transition p14:dur="0"/>
     </mc:Choice>
-    <mc:Fallback>
+    <mc:Fallback xmlns="">
       <p:transition/>
     </mc:Fallback>
   </mc:AlternateContent>
@@ -11617,11 +11706,11 @@
   <p:clrMapOvr>
     <a:masterClrMapping/>
   </p:clrMapOvr>
-  <mc:AlternateContent xmlns:mc="http://schemas.openxmlformats.org/markup-compatibility/2006">
-    <mc:Choice xmlns:p14="http://schemas.microsoft.com/office/powerpoint/2010/main" Requires="p14">
+  <mc:AlternateContent xmlns:mc="http://schemas.openxmlformats.org/markup-compatibility/2006" xmlns:p14="http://schemas.microsoft.com/office/powerpoint/2010/main">
+    <mc:Choice Requires="p14">
       <p:transition p14:dur="0"/>
     </mc:Choice>
-    <mc:Fallback>
+    <mc:Fallback xmlns="">
       <p:transition/>
     </mc:Fallback>
   </mc:AlternateContent>
@@ -11705,7 +11794,7 @@
           <p:nvPr/>
         </p:nvPicPr>
         <mc:AlternateContent xmlns:mc="http://schemas.openxmlformats.org/markup-compatibility/2006">
-          <mc:Choice xmlns="" xmlns:mv="urn:schemas-microsoft-com:mac:vml" xmlns:ma="http://schemas.microsoft.com/office/mac/drawingml/2008/main" Requires="ma">
+          <mc:Choice xmlns:ma="http://schemas.microsoft.com/office/mac/drawingml/2008/main" xmlns:mv="urn:schemas-microsoft-com:mac:vml" xmlns="" Requires="ma">
             <p:blipFill>
               <a:blip r:embed="rId2"/>
               <a:stretch>
@@ -11766,11 +11855,11 @@
   <p:clrMapOvr>
     <a:overrideClrMapping bg1="dk1" tx1="lt1" bg2="dk2" tx2="lt2" accent1="accent1" accent2="accent2" accent3="accent3" accent4="accent4" accent5="accent5" accent6="accent6" hlink="hlink" folHlink="folHlink"/>
   </p:clrMapOvr>
-  <mc:AlternateContent xmlns:mc="http://schemas.openxmlformats.org/markup-compatibility/2006">
-    <mc:Choice xmlns:p14="http://schemas.microsoft.com/office/powerpoint/2010/main" Requires="p14">
+  <mc:AlternateContent xmlns:mc="http://schemas.openxmlformats.org/markup-compatibility/2006" xmlns:p14="http://schemas.microsoft.com/office/powerpoint/2010/main">
+    <mc:Choice Requires="p14">
       <p:transition p14:dur="0"/>
     </mc:Choice>
-    <mc:Fallback>
+    <mc:Fallback xmlns="">
       <p:transition/>
     </mc:Fallback>
   </mc:AlternateContent>
@@ -11969,7 +12058,7 @@
           <p:nvPr/>
         </p:nvPicPr>
         <mc:AlternateContent xmlns:mc="http://schemas.openxmlformats.org/markup-compatibility/2006">
-          <mc:Choice xmlns="" xmlns:mv="urn:schemas-microsoft-com:mac:vml" xmlns:ma="http://schemas.microsoft.com/office/mac/drawingml/2008/main" Requires="ma">
+          <mc:Choice xmlns:ma="http://schemas.microsoft.com/office/mac/drawingml/2008/main" xmlns:mv="urn:schemas-microsoft-com:mac:vml" xmlns="" Requires="ma">
             <p:blipFill>
               <a:blip r:embed="rId4"/>
               <a:srcRect l="19002" t="43683" r="16409" b="45008"/>
@@ -12015,11 +12104,11 @@
   <p:clrMapOvr>
     <a:masterClrMapping/>
   </p:clrMapOvr>
-  <mc:AlternateContent xmlns:mc="http://schemas.openxmlformats.org/markup-compatibility/2006">
-    <mc:Choice xmlns:p14="http://schemas.microsoft.com/office/powerpoint/2010/main" Requires="p14">
+  <mc:AlternateContent xmlns:mc="http://schemas.openxmlformats.org/markup-compatibility/2006" xmlns:p14="http://schemas.microsoft.com/office/powerpoint/2010/main">
+    <mc:Choice Requires="p14">
       <p:transition p14:dur="0"/>
     </mc:Choice>
-    <mc:Fallback>
+    <mc:Fallback xmlns="">
       <p:transition/>
     </mc:Fallback>
   </mc:AlternateContent>
@@ -12378,7 +12467,7 @@
           <p:nvPr/>
         </p:nvPicPr>
         <mc:AlternateContent xmlns:mc="http://schemas.openxmlformats.org/markup-compatibility/2006">
-          <mc:Choice xmlns="" xmlns:mv="urn:schemas-microsoft-com:mac:vml" xmlns:ma="http://schemas.microsoft.com/office/mac/drawingml/2008/main" Requires="ma">
+          <mc:Choice xmlns:ma="http://schemas.microsoft.com/office/mac/drawingml/2008/main" xmlns:mv="urn:schemas-microsoft-com:mac:vml" xmlns="" Requires="ma">
             <p:blipFill>
               <a:blip r:embed="rId4"/>
               <a:stretch>
@@ -12415,11 +12504,11 @@
   <p:clrMapOvr>
     <a:masterClrMapping/>
   </p:clrMapOvr>
-  <mc:AlternateContent xmlns:mc="http://schemas.openxmlformats.org/markup-compatibility/2006">
-    <mc:Choice xmlns:p14="http://schemas.microsoft.com/office/powerpoint/2010/main" Requires="p14">
+  <mc:AlternateContent xmlns:mc="http://schemas.openxmlformats.org/markup-compatibility/2006" xmlns:p14="http://schemas.microsoft.com/office/powerpoint/2010/main">
+    <mc:Choice Requires="p14">
       <p:transition p14:dur="0"/>
     </mc:Choice>
-    <mc:Fallback>
+    <mc:Fallback xmlns="">
       <p:transition/>
     </mc:Fallback>
   </mc:AlternateContent>
@@ -12601,7 +12690,7 @@
           <p:nvPr/>
         </p:nvPicPr>
         <mc:AlternateContent xmlns:mc="http://schemas.openxmlformats.org/markup-compatibility/2006">
-          <mc:Choice xmlns="" xmlns:mv="urn:schemas-microsoft-com:mac:vml" xmlns:ma="http://schemas.microsoft.com/office/mac/drawingml/2008/main" Requires="ma">
+          <mc:Choice xmlns:ma="http://schemas.microsoft.com/office/mac/drawingml/2008/main" xmlns:mv="urn:schemas-microsoft-com:mac:vml" xmlns="" Requires="ma">
             <p:blipFill>
               <a:blip r:embed="rId11"/>
               <a:stretch>
@@ -12638,11 +12727,11 @@
   <p:clrMapOvr>
     <a:masterClrMapping/>
   </p:clrMapOvr>
-  <mc:AlternateContent xmlns:mc="http://schemas.openxmlformats.org/markup-compatibility/2006">
-    <mc:Choice xmlns:p14="http://schemas.microsoft.com/office/powerpoint/2010/main" Requires="p14">
+  <mc:AlternateContent xmlns:mc="http://schemas.openxmlformats.org/markup-compatibility/2006" xmlns:p14="http://schemas.microsoft.com/office/powerpoint/2010/main">
+    <mc:Choice Requires="p14">
       <p:transition p14:dur="0"/>
     </mc:Choice>
-    <mc:Fallback>
+    <mc:Fallback xmlns="">
       <p:transition/>
     </mc:Fallback>
   </mc:AlternateContent>
@@ -12882,7 +12971,7 @@
           <p:nvPr/>
         </p:nvPicPr>
         <mc:AlternateContent xmlns:mc="http://schemas.openxmlformats.org/markup-compatibility/2006">
-          <mc:Choice xmlns="" xmlns:mv="urn:schemas-microsoft-com:mac:vml" xmlns:ma="http://schemas.microsoft.com/office/mac/drawingml/2008/main" Requires="ma">
+          <mc:Choice xmlns:ma="http://schemas.microsoft.com/office/mac/drawingml/2008/main" xmlns:mv="urn:schemas-microsoft-com:mac:vml" xmlns="" Requires="ma">
             <p:blipFill>
               <a:blip r:embed="rId11"/>
               <a:stretch>
@@ -12947,11 +13036,11 @@
   <p:clrMapOvr>
     <a:masterClrMapping/>
   </p:clrMapOvr>
-  <mc:AlternateContent xmlns:mc="http://schemas.openxmlformats.org/markup-compatibility/2006">
-    <mc:Choice xmlns:p14="http://schemas.microsoft.com/office/powerpoint/2010/main" Requires="p14">
+  <mc:AlternateContent xmlns:mc="http://schemas.openxmlformats.org/markup-compatibility/2006" xmlns:p14="http://schemas.microsoft.com/office/powerpoint/2010/main">
+    <mc:Choice Requires="p14">
       <p:transition p14:dur="0"/>
     </mc:Choice>
-    <mc:Fallback>
+    <mc:Fallback xmlns="">
       <p:transition/>
     </mc:Fallback>
   </mc:AlternateContent>
@@ -13191,7 +13280,7 @@
           <p:nvPr/>
         </p:nvPicPr>
         <mc:AlternateContent xmlns:mc="http://schemas.openxmlformats.org/markup-compatibility/2006">
-          <mc:Choice xmlns="" xmlns:mv="urn:schemas-microsoft-com:mac:vml" xmlns:ma="http://schemas.microsoft.com/office/mac/drawingml/2008/main" Requires="ma">
+          <mc:Choice xmlns:ma="http://schemas.microsoft.com/office/mac/drawingml/2008/main" xmlns:mv="urn:schemas-microsoft-com:mac:vml" xmlns="" Requires="ma">
             <p:blipFill>
               <a:blip r:embed="rId11"/>
               <a:stretch>
@@ -13256,11 +13345,11 @@
   <p:clrMapOvr>
     <a:masterClrMapping/>
   </p:clrMapOvr>
-  <mc:AlternateContent xmlns:mc="http://schemas.openxmlformats.org/markup-compatibility/2006">
-    <mc:Choice xmlns:p14="http://schemas.microsoft.com/office/powerpoint/2010/main" Requires="p14">
+  <mc:AlternateContent xmlns:mc="http://schemas.openxmlformats.org/markup-compatibility/2006" xmlns:p14="http://schemas.microsoft.com/office/powerpoint/2010/main">
+    <mc:Choice Requires="p14">
       <p:transition p14:dur="0"/>
     </mc:Choice>
-    <mc:Fallback>
+    <mc:Fallback xmlns="">
       <p:transition/>
     </mc:Fallback>
   </mc:AlternateContent>
@@ -13595,7 +13684,7 @@
           <p:nvPr/>
         </p:nvPicPr>
         <mc:AlternateContent xmlns:mc="http://schemas.openxmlformats.org/markup-compatibility/2006">
-          <mc:Choice xmlns="" xmlns:mv="urn:schemas-microsoft-com:mac:vml" xmlns:ma="http://schemas.microsoft.com/office/mac/drawingml/2008/main" Requires="ma">
+          <mc:Choice xmlns:ma="http://schemas.microsoft.com/office/mac/drawingml/2008/main" xmlns:mv="urn:schemas-microsoft-com:mac:vml" xmlns="" Requires="ma">
             <p:blipFill>
               <a:blip r:embed="rId11"/>
               <a:stretch>
@@ -13660,11 +13749,11 @@
   <p:clrMapOvr>
     <a:masterClrMapping/>
   </p:clrMapOvr>
-  <mc:AlternateContent xmlns:mc="http://schemas.openxmlformats.org/markup-compatibility/2006">
-    <mc:Choice xmlns:p14="http://schemas.microsoft.com/office/powerpoint/2010/main" Requires="p14">
+  <mc:AlternateContent xmlns:mc="http://schemas.openxmlformats.org/markup-compatibility/2006" xmlns:p14="http://schemas.microsoft.com/office/powerpoint/2010/main">
+    <mc:Choice Requires="p14">
       <p:transition p14:dur="0"/>
     </mc:Choice>
-    <mc:Fallback>
+    <mc:Fallback xmlns="">
       <p:transition/>
     </mc:Fallback>
   </mc:AlternateContent>
@@ -13909,7 +13998,7 @@
           <p:nvPr/>
         </p:nvPicPr>
         <mc:AlternateContent xmlns:mc="http://schemas.openxmlformats.org/markup-compatibility/2006">
-          <mc:Choice xmlns="" xmlns:mv="urn:schemas-microsoft-com:mac:vml" xmlns:ma="http://schemas.microsoft.com/office/mac/drawingml/2008/main" Requires="ma">
+          <mc:Choice xmlns:ma="http://schemas.microsoft.com/office/mac/drawingml/2008/main" xmlns:mv="urn:schemas-microsoft-com:mac:vml" xmlns="" Requires="ma">
             <p:blipFill>
               <a:blip r:embed="rId11"/>
               <a:stretch>
@@ -15075,11 +15164,11 @@
   <p:clrMapOvr>
     <a:masterClrMapping/>
   </p:clrMapOvr>
-  <mc:AlternateContent xmlns:mc="http://schemas.openxmlformats.org/markup-compatibility/2006">
-    <mc:Choice xmlns:p14="http://schemas.microsoft.com/office/powerpoint/2010/main" Requires="p14">
+  <mc:AlternateContent xmlns:mc="http://schemas.openxmlformats.org/markup-compatibility/2006" xmlns:p14="http://schemas.microsoft.com/office/powerpoint/2010/main">
+    <mc:Choice Requires="p14">
       <p:transition p14:dur="0"/>
     </mc:Choice>
-    <mc:Fallback>
+    <mc:Fallback xmlns="">
       <p:transition/>
     </mc:Fallback>
   </mc:AlternateContent>
@@ -15687,7 +15776,7 @@
           <p:nvPr/>
         </p:nvPicPr>
         <mc:AlternateContent xmlns:mc="http://schemas.openxmlformats.org/markup-compatibility/2006">
-          <mc:Choice xmlns="" xmlns:mv="urn:schemas-microsoft-com:mac:vml" xmlns:ma="http://schemas.microsoft.com/office/mac/drawingml/2008/main" Requires="ma">
+          <mc:Choice xmlns:ma="http://schemas.microsoft.com/office/mac/drawingml/2008/main" xmlns:mv="urn:schemas-microsoft-com:mac:vml" xmlns="" Requires="ma">
             <p:blipFill>
               <a:blip r:embed="rId11"/>
               <a:stretch>
@@ -15752,11 +15841,11 @@
   <p:clrMapOvr>
     <a:masterClrMapping/>
   </p:clrMapOvr>
-  <mc:AlternateContent xmlns:mc="http://schemas.openxmlformats.org/markup-compatibility/2006">
-    <mc:Choice xmlns:p14="http://schemas.microsoft.com/office/powerpoint/2010/main" Requires="p14">
+  <mc:AlternateContent xmlns:mc="http://schemas.openxmlformats.org/markup-compatibility/2006" xmlns:p14="http://schemas.microsoft.com/office/powerpoint/2010/main">
+    <mc:Choice Requires="p14">
       <p:transition p14:dur="0"/>
     </mc:Choice>
-    <mc:Fallback>
+    <mc:Fallback xmlns="">
       <p:transition/>
     </mc:Fallback>
   </mc:AlternateContent>
@@ -16250,11 +16339,11 @@
   <p:clrMapOvr>
     <a:masterClrMapping/>
   </p:clrMapOvr>
-  <mc:AlternateContent xmlns:mc="http://schemas.openxmlformats.org/markup-compatibility/2006">
-    <mc:Choice xmlns:p14="http://schemas.microsoft.com/office/powerpoint/2010/main" Requires="p14">
+  <mc:AlternateContent xmlns:mc="http://schemas.openxmlformats.org/markup-compatibility/2006" xmlns:p14="http://schemas.microsoft.com/office/powerpoint/2010/main">
+    <mc:Choice Requires="p14">
       <p:transition p14:dur="0"/>
     </mc:Choice>
-    <mc:Fallback>
+    <mc:Fallback xmlns="">
       <p:transition/>
     </mc:Fallback>
   </mc:AlternateContent>
@@ -16705,11 +16794,11 @@
   <p:clrMapOvr>
     <a:masterClrMapping/>
   </p:clrMapOvr>
-  <mc:AlternateContent xmlns:mc="http://schemas.openxmlformats.org/markup-compatibility/2006">
-    <mc:Choice xmlns:p14="http://schemas.microsoft.com/office/powerpoint/2010/main" Requires="p14">
+  <mc:AlternateContent xmlns:mc="http://schemas.openxmlformats.org/markup-compatibility/2006" xmlns:p14="http://schemas.microsoft.com/office/powerpoint/2010/main">
+    <mc:Choice Requires="p14">
       <p:transition p14:dur="0"/>
     </mc:Choice>
-    <mc:Fallback>
+    <mc:Fallback xmlns="">
       <p:transition/>
     </mc:Fallback>
   </mc:AlternateContent>
@@ -17067,11 +17156,11 @@
   <p:clrMapOvr>
     <a:masterClrMapping/>
   </p:clrMapOvr>
-  <mc:AlternateContent xmlns:mc="http://schemas.openxmlformats.org/markup-compatibility/2006">
-    <mc:Choice xmlns:p14="http://schemas.microsoft.com/office/powerpoint/2010/main" Requires="p14">
+  <mc:AlternateContent xmlns:mc="http://schemas.openxmlformats.org/markup-compatibility/2006" xmlns:p14="http://schemas.microsoft.com/office/powerpoint/2010/main">
+    <mc:Choice Requires="p14">
       <p:transition p14:dur="0"/>
     </mc:Choice>
-    <mc:Fallback>
+    <mc:Fallback xmlns="">
       <p:transition/>
     </mc:Fallback>
   </mc:AlternateContent>
@@ -22586,11 +22675,11 @@
   <p:clrMapOvr>
     <a:masterClrMapping/>
   </p:clrMapOvr>
-  <mc:AlternateContent xmlns:mc="http://schemas.openxmlformats.org/markup-compatibility/2006">
-    <mc:Choice xmlns:p14="http://schemas.microsoft.com/office/powerpoint/2010/main" Requires="p14">
+  <mc:AlternateContent xmlns:mc="http://schemas.openxmlformats.org/markup-compatibility/2006" xmlns:p14="http://schemas.microsoft.com/office/powerpoint/2010/main">
+    <mc:Choice Requires="p14">
       <p:transition p14:dur="0"/>
     </mc:Choice>
-    <mc:Fallback>
+    <mc:Fallback xmlns="">
       <p:transition/>
     </mc:Fallback>
   </mc:AlternateContent>
@@ -23082,11 +23171,11 @@
   <p:clrMapOvr>
     <a:masterClrMapping/>
   </p:clrMapOvr>
-  <mc:AlternateContent xmlns:mc="http://schemas.openxmlformats.org/markup-compatibility/2006">
-    <mc:Choice xmlns:p14="http://schemas.microsoft.com/office/powerpoint/2010/main" Requires="p14">
+  <mc:AlternateContent xmlns:mc="http://schemas.openxmlformats.org/markup-compatibility/2006" xmlns:p14="http://schemas.microsoft.com/office/powerpoint/2010/main">
+    <mc:Choice Requires="p14">
       <p:transition p14:dur="0"/>
     </mc:Choice>
-    <mc:Fallback>
+    <mc:Fallback xmlns="">
       <p:transition/>
     </mc:Fallback>
   </mc:AlternateContent>
@@ -23419,11 +23508,11 @@
   <p:clrMapOvr>
     <a:masterClrMapping/>
   </p:clrMapOvr>
-  <mc:AlternateContent xmlns:mc="http://schemas.openxmlformats.org/markup-compatibility/2006">
-    <mc:Choice xmlns:p14="http://schemas.microsoft.com/office/powerpoint/2010/main" Requires="p14">
+  <mc:AlternateContent xmlns:mc="http://schemas.openxmlformats.org/markup-compatibility/2006" xmlns:p14="http://schemas.microsoft.com/office/powerpoint/2010/main">
+    <mc:Choice Requires="p14">
       <p:transition p14:dur="0"/>
     </mc:Choice>
-    <mc:Fallback>
+    <mc:Fallback xmlns="">
       <p:transition/>
     </mc:Fallback>
   </mc:AlternateContent>
@@ -23578,11 +23667,11 @@
   <p:clrMapOvr>
     <a:masterClrMapping/>
   </p:clrMapOvr>
-  <mc:AlternateContent xmlns:mc="http://schemas.openxmlformats.org/markup-compatibility/2006">
-    <mc:Choice xmlns:p14="http://schemas.microsoft.com/office/powerpoint/2010/main" Requires="p14">
+  <mc:AlternateContent xmlns:mc="http://schemas.openxmlformats.org/markup-compatibility/2006" xmlns:p14="http://schemas.microsoft.com/office/powerpoint/2010/main">
+    <mc:Choice Requires="p14">
       <p:transition p14:dur="0"/>
     </mc:Choice>
-    <mc:Fallback>
+    <mc:Fallback xmlns="">
       <p:transition/>
     </mc:Fallback>
   </mc:AlternateContent>
@@ -23932,11 +24021,11 @@
   <p:clrMapOvr>
     <a:masterClrMapping/>
   </p:clrMapOvr>
-  <mc:AlternateContent xmlns:mc="http://schemas.openxmlformats.org/markup-compatibility/2006">
-    <mc:Choice xmlns:p14="http://schemas.microsoft.com/office/powerpoint/2010/main" Requires="p14">
+  <mc:AlternateContent xmlns:mc="http://schemas.openxmlformats.org/markup-compatibility/2006" xmlns:p14="http://schemas.microsoft.com/office/powerpoint/2010/main">
+    <mc:Choice Requires="p14">
       <p:transition p14:dur="0"/>
     </mc:Choice>
-    <mc:Fallback>
+    <mc:Fallback xmlns="">
       <p:transition/>
     </mc:Fallback>
   </mc:AlternateContent>
@@ -24105,11 +24194,11 @@
   <p:clrMapOvr>
     <a:masterClrMapping/>
   </p:clrMapOvr>
-  <mc:AlternateContent xmlns:mc="http://schemas.openxmlformats.org/markup-compatibility/2006">
-    <mc:Choice xmlns:p14="http://schemas.microsoft.com/office/powerpoint/2010/main" Requires="p14">
+  <mc:AlternateContent xmlns:mc="http://schemas.openxmlformats.org/markup-compatibility/2006" xmlns:p14="http://schemas.microsoft.com/office/powerpoint/2010/main">
+    <mc:Choice Requires="p14">
       <p:transition p14:dur="0"/>
     </mc:Choice>
-    <mc:Fallback>
+    <mc:Fallback xmlns="">
       <p:transition/>
     </mc:Fallback>
   </mc:AlternateContent>
@@ -24448,11 +24537,11 @@
   <p:clrMapOvr>
     <a:masterClrMapping/>
   </p:clrMapOvr>
-  <mc:AlternateContent xmlns:mc="http://schemas.openxmlformats.org/markup-compatibility/2006">
-    <mc:Choice xmlns:p14="http://schemas.microsoft.com/office/powerpoint/2010/main" Requires="p14">
+  <mc:AlternateContent xmlns:mc="http://schemas.openxmlformats.org/markup-compatibility/2006" xmlns:p14="http://schemas.microsoft.com/office/powerpoint/2010/main">
+    <mc:Choice Requires="p14">
       <p:transition p14:dur="0"/>
     </mc:Choice>
-    <mc:Fallback>
+    <mc:Fallback xmlns="">
       <p:transition/>
     </mc:Fallback>
   </mc:AlternateContent>
@@ -24838,11 +24927,11 @@
   <p:clrMapOvr>
     <a:masterClrMapping/>
   </p:clrMapOvr>
-  <mc:AlternateContent xmlns:mc="http://schemas.openxmlformats.org/markup-compatibility/2006">
-    <mc:Choice xmlns:p14="http://schemas.microsoft.com/office/powerpoint/2010/main" Requires="p14">
+  <mc:AlternateContent xmlns:mc="http://schemas.openxmlformats.org/markup-compatibility/2006" xmlns:p14="http://schemas.microsoft.com/office/powerpoint/2010/main">
+    <mc:Choice Requires="p14">
       <p:transition p14:dur="0"/>
     </mc:Choice>
-    <mc:Fallback>
+    <mc:Fallback xmlns="">
       <p:transition/>
     </mc:Fallback>
   </mc:AlternateContent>
@@ -24978,11 +25067,11 @@
   <p:clrMapOvr>
     <a:masterClrMapping/>
   </p:clrMapOvr>
-  <mc:AlternateContent xmlns:mc="http://schemas.openxmlformats.org/markup-compatibility/2006">
-    <mc:Choice xmlns:p14="http://schemas.microsoft.com/office/powerpoint/2010/main" Requires="p14">
+  <mc:AlternateContent xmlns:mc="http://schemas.openxmlformats.org/markup-compatibility/2006" xmlns:p14="http://schemas.microsoft.com/office/powerpoint/2010/main">
+    <mc:Choice Requires="p14">
       <p:transition p14:dur="0"/>
     </mc:Choice>
-    <mc:Fallback>
+    <mc:Fallback xmlns="">
       <p:transition/>
     </mc:Fallback>
   </mc:AlternateContent>
@@ -25317,11 +25406,11 @@
   <p:clrMapOvr>
     <a:masterClrMapping/>
   </p:clrMapOvr>
-  <mc:AlternateContent xmlns:mc="http://schemas.openxmlformats.org/markup-compatibility/2006">
-    <mc:Choice xmlns:p14="http://schemas.microsoft.com/office/powerpoint/2010/main" Requires="p14">
+  <mc:AlternateContent xmlns:mc="http://schemas.openxmlformats.org/markup-compatibility/2006" xmlns:p14="http://schemas.microsoft.com/office/powerpoint/2010/main">
+    <mc:Choice Requires="p14">
       <p:transition p14:dur="0"/>
     </mc:Choice>
-    <mc:Fallback>
+    <mc:Fallback xmlns="">
       <p:transition/>
     </mc:Fallback>
   </mc:AlternateContent>
@@ -29439,11 +29528,11 @@
   <p:clrMapOvr>
     <a:masterClrMapping/>
   </p:clrMapOvr>
-  <mc:AlternateContent xmlns:mc="http://schemas.openxmlformats.org/markup-compatibility/2006">
-    <mc:Choice xmlns:p14="http://schemas.microsoft.com/office/powerpoint/2010/main" Requires="p14">
+  <mc:AlternateContent xmlns:mc="http://schemas.openxmlformats.org/markup-compatibility/2006" xmlns:p14="http://schemas.microsoft.com/office/powerpoint/2010/main">
+    <mc:Choice Requires="p14">
       <p:transition p14:dur="0"/>
     </mc:Choice>
-    <mc:Fallback>
+    <mc:Fallback xmlns="">
       <p:transition/>
     </mc:Fallback>
   </mc:AlternateContent>
@@ -29661,11 +29750,11 @@
   <p:clrMapOvr>
     <a:masterClrMapping/>
   </p:clrMapOvr>
-  <mc:AlternateContent xmlns:mc="http://schemas.openxmlformats.org/markup-compatibility/2006">
-    <mc:Choice xmlns:p14="http://schemas.microsoft.com/office/powerpoint/2010/main" Requires="p14">
+  <mc:AlternateContent xmlns:mc="http://schemas.openxmlformats.org/markup-compatibility/2006" xmlns:p14="http://schemas.microsoft.com/office/powerpoint/2010/main">
+    <mc:Choice Requires="p14">
       <p:transition p14:dur="0"/>
     </mc:Choice>
-    <mc:Fallback>
+    <mc:Fallback xmlns="">
       <p:transition/>
     </mc:Fallback>
   </mc:AlternateContent>
@@ -29696,6 +29785,268 @@
           <a:chExt cx="0" cy="0"/>
         </a:xfrm>
       </p:grpSpPr>
+      <p:pic>
+        <p:nvPicPr>
+          <p:cNvPr id="4" name="Content Placeholder 3"/>
+          <p:cNvPicPr>
+            <a:picLocks noGrp="1" noChangeAspect="1"/>
+          </p:cNvPicPr>
+          <p:nvPr>
+            <p:ph sz="quarter" idx="10"/>
+          </p:nvPr>
+        </p:nvPicPr>
+        <p:blipFill>
+          <a:blip r:embed="rId3">
+            <a:extLst>
+              <a:ext uri="{28A0092B-C50C-407E-A947-70E740481C1C}">
+                <a14:useLocalDpi xmlns:a14="http://schemas.microsoft.com/office/drawing/2010/main" val="0"/>
+              </a:ext>
+            </a:extLst>
+          </a:blip>
+          <a:stretch>
+            <a:fillRect/>
+          </a:stretch>
+        </p:blipFill>
+        <p:spPr>
+          <a:xfrm>
+            <a:off x="2448614" y="1739900"/>
+            <a:ext cx="7990096" cy="4495800"/>
+          </a:xfrm>
+        </p:spPr>
+      </p:pic>
+      <p:sp>
+        <p:nvSpPr>
+          <p:cNvPr id="3" name="Title 2"/>
+          <p:cNvSpPr>
+            <a:spLocks noGrp="1"/>
+          </p:cNvSpPr>
+          <p:nvPr>
+            <p:ph type="title"/>
+          </p:nvPr>
+        </p:nvSpPr>
+        <p:spPr/>
+        <p:txBody>
+          <a:bodyPr/>
+          <a:lstStyle/>
+          <a:p>
+            <a:endParaRPr lang="en-US"/>
+          </a:p>
+        </p:txBody>
+      </p:sp>
+    </p:spTree>
+    <p:extLst>
+      <p:ext uri="{BB962C8B-B14F-4D97-AF65-F5344CB8AC3E}">
+        <p14:creationId xmlns:p14="http://schemas.microsoft.com/office/powerpoint/2010/main" val="4082962142"/>
+      </p:ext>
+    </p:extLst>
+  </p:cSld>
+  <p:clrMapOvr>
+    <a:masterClrMapping/>
+  </p:clrMapOvr>
+  <mc:AlternateContent xmlns:mc="http://schemas.openxmlformats.org/markup-compatibility/2006">
+    <mc:Choice xmlns:p14="http://schemas.microsoft.com/office/powerpoint/2010/main" Requires="p14">
+      <p:transition p14:dur="0"/>
+    </mc:Choice>
+    <mc:Fallback>
+      <p:transition/>
+    </mc:Fallback>
+  </mc:AlternateContent>
+  <p:timing>
+    <p:tnLst>
+      <p:par>
+        <p:cTn id="1" dur="indefinite" restart="never" nodeType="tmRoot"/>
+      </p:par>
+    </p:tnLst>
+  </p:timing>
+</p:sld>
+</file>
+
+<file path=ppt/slides/slide24.xml><?xml version="1.0" encoding="utf-8"?>
+<p:sld xmlns:a="http://schemas.openxmlformats.org/drawingml/2006/main" xmlns:r="http://schemas.openxmlformats.org/officeDocument/2006/relationships" xmlns:p="http://schemas.openxmlformats.org/presentationml/2006/main">
+  <p:cSld>
+    <p:spTree>
+      <p:nvGrpSpPr>
+        <p:cNvPr id="1" name=""/>
+        <p:cNvGrpSpPr/>
+        <p:nvPr/>
+      </p:nvGrpSpPr>
+      <p:grpSpPr>
+        <a:xfrm>
+          <a:off x="0" y="0"/>
+          <a:ext cx="0" cy="0"/>
+          <a:chOff x="0" y="0"/>
+          <a:chExt cx="0" cy="0"/>
+        </a:xfrm>
+      </p:grpSpPr>
+      <p:sp>
+        <p:nvSpPr>
+          <p:cNvPr id="7" name="Content Placeholder 6"/>
+          <p:cNvSpPr>
+            <a:spLocks noGrp="1"/>
+          </p:cNvSpPr>
+          <p:nvPr>
+            <p:ph idx="1"/>
+          </p:nvPr>
+        </p:nvSpPr>
+        <p:spPr/>
+        <p:txBody>
+          <a:bodyPr/>
+          <a:lstStyle/>
+          <a:p>
+            <a:pPr marL="0" indent="0">
+              <a:buNone/>
+            </a:pPr>
+            <a:r>
+              <a:rPr lang="en-US" b="1" dirty="0"/>
+              <a:t>Introduction to Building Windows Store Apps with Windows Azure Mobile </a:t>
+            </a:r>
+            <a:r>
+              <a:rPr lang="en-US" b="1" dirty="0" smtClean="0"/>
+              <a:t>Services (C#/XAML or JS/HTML5)</a:t>
+            </a:r>
+            <a:br>
+              <a:rPr lang="en-US" b="1" dirty="0" smtClean="0"/>
+            </a:br>
+            <a:endParaRPr lang="en-US" b="1" dirty="0"/>
+          </a:p>
+          <a:p>
+            <a:r>
+              <a:rPr lang="en-US" dirty="0"/>
+              <a:t>Creating your first Mobile Service</a:t>
+            </a:r>
+          </a:p>
+          <a:p>
+            <a:r>
+              <a:rPr lang="en-US" dirty="0"/>
+              <a:t>Adding Push Notifications to your app</a:t>
+            </a:r>
+          </a:p>
+          <a:p>
+            <a:r>
+              <a:rPr lang="en-US" dirty="0"/>
+              <a:t>Adding </a:t>
+            </a:r>
+            <a:r>
+              <a:rPr lang="en-US" dirty="0" err="1"/>
+              <a:t>Auth</a:t>
+            </a:r>
+            <a:r>
+              <a:rPr lang="en-US" dirty="0"/>
+              <a:t> to Your App and Services</a:t>
+            </a:r>
+          </a:p>
+          <a:p>
+            <a:r>
+              <a:rPr lang="en-US" dirty="0"/>
+              <a:t>Adding a Scheduled Job to your Mobile Service</a:t>
+            </a:r>
+          </a:p>
+          <a:p>
+            <a:pPr marL="0" indent="0">
+              <a:buNone/>
+            </a:pPr>
+            <a:endParaRPr lang="en-US" dirty="0"/>
+          </a:p>
+        </p:txBody>
+      </p:sp>
+      <p:sp>
+        <p:nvSpPr>
+          <p:cNvPr id="4" name="Title 3"/>
+          <p:cNvSpPr>
+            <a:spLocks noGrp="1"/>
+          </p:cNvSpPr>
+          <p:nvPr>
+            <p:ph type="title"/>
+          </p:nvPr>
+        </p:nvSpPr>
+        <p:spPr/>
+        <p:txBody>
+          <a:bodyPr/>
+          <a:lstStyle/>
+          <a:p>
+            <a:r>
+              <a:rPr lang="en-US" dirty="0" smtClean="0"/>
+              <a:t>HANDS ON LAB</a:t>
+            </a:r>
+            <a:endParaRPr lang="en-US" dirty="0"/>
+          </a:p>
+        </p:txBody>
+      </p:sp>
+      <p:pic>
+        <p:nvPicPr>
+          <p:cNvPr id="8" name="Content Placeholder 3"/>
+          <p:cNvPicPr>
+            <a:picLocks noChangeAspect="1"/>
+          </p:cNvPicPr>
+          <p:nvPr/>
+        </p:nvPicPr>
+        <p:blipFill>
+          <a:blip r:embed="rId2">
+            <a:extLst>
+              <a:ext uri="{28A0092B-C50C-407E-A947-70E740481C1C}">
+                <a14:useLocalDpi xmlns:a14="http://schemas.microsoft.com/office/drawing/2010/main" val="0"/>
+              </a:ext>
+            </a:extLst>
+          </a:blip>
+          <a:stretch>
+            <a:fillRect/>
+          </a:stretch>
+        </p:blipFill>
+        <p:spPr>
+          <a:xfrm>
+            <a:off x="7014040" y="2301240"/>
+            <a:ext cx="4507400" cy="2536186"/>
+          </a:xfrm>
+          <a:prstGeom prst="rect">
+            <a:avLst/>
+          </a:prstGeom>
+        </p:spPr>
+      </p:pic>
+    </p:spTree>
+    <p:extLst>
+      <p:ext uri="{BB962C8B-B14F-4D97-AF65-F5344CB8AC3E}">
+        <p14:creationId xmlns:p14="http://schemas.microsoft.com/office/powerpoint/2010/main" val="2106937543"/>
+      </p:ext>
+    </p:extLst>
+  </p:cSld>
+  <p:clrMapOvr>
+    <a:masterClrMapping/>
+  </p:clrMapOvr>
+  <mc:AlternateContent xmlns:mc="http://schemas.openxmlformats.org/markup-compatibility/2006" xmlns:p14="http://schemas.microsoft.com/office/powerpoint/2010/main">
+    <mc:Choice Requires="p14">
+      <p:transition p14:dur="0"/>
+    </mc:Choice>
+    <mc:Fallback xmlns="">
+      <p:transition/>
+    </mc:Fallback>
+  </mc:AlternateContent>
+  <p:timing>
+    <p:tnLst>
+      <p:par>
+        <p:cTn id="1" dur="indefinite" restart="never" nodeType="tmRoot"/>
+      </p:par>
+    </p:tnLst>
+  </p:timing>
+</p:sld>
+</file>
+
+<file path=ppt/slides/slide25.xml><?xml version="1.0" encoding="utf-8"?>
+<p:sld xmlns:a="http://schemas.openxmlformats.org/drawingml/2006/main" xmlns:r="http://schemas.openxmlformats.org/officeDocument/2006/relationships" xmlns:p="http://schemas.openxmlformats.org/presentationml/2006/main">
+  <p:cSld>
+    <p:spTree>
+      <p:nvGrpSpPr>
+        <p:cNvPr id="1" name=""/>
+        <p:cNvGrpSpPr/>
+        <p:nvPr/>
+      </p:nvGrpSpPr>
+      <p:grpSpPr>
+        <a:xfrm>
+          <a:off x="0" y="0"/>
+          <a:ext cx="0" cy="0"/>
+          <a:chOff x="0" y="0"/>
+          <a:chExt cx="0" cy="0"/>
+        </a:xfrm>
+      </p:grpSpPr>
       <p:sp>
         <p:nvSpPr>
           <p:cNvPr id="2" name="Title 1"/>
@@ -29729,11 +30080,11 @@
   <p:clrMapOvr>
     <a:masterClrMapping/>
   </p:clrMapOvr>
-  <mc:AlternateContent xmlns:mc="http://schemas.openxmlformats.org/markup-compatibility/2006">
-    <mc:Choice xmlns:p14="http://schemas.microsoft.com/office/powerpoint/2010/main" Requires="p14">
+  <mc:AlternateContent xmlns:mc="http://schemas.openxmlformats.org/markup-compatibility/2006" xmlns:p14="http://schemas.microsoft.com/office/powerpoint/2010/main">
+    <mc:Choice Requires="p14">
       <p:transition p14:dur="0"/>
     </mc:Choice>
-    <mc:Fallback>
+    <mc:Fallback xmlns="">
       <p:transition/>
     </mc:Fallback>
   </mc:AlternateContent>
@@ -30209,11 +30560,11 @@
   <p:clrMapOvr>
     <a:masterClrMapping/>
   </p:clrMapOvr>
-  <mc:AlternateContent xmlns:mc="http://schemas.openxmlformats.org/markup-compatibility/2006">
-    <mc:Choice xmlns:p14="http://schemas.microsoft.com/office/powerpoint/2010/main" Requires="p14">
+  <mc:AlternateContent xmlns:mc="http://schemas.openxmlformats.org/markup-compatibility/2006" xmlns:p14="http://schemas.microsoft.com/office/powerpoint/2010/main">
+    <mc:Choice Requires="p14">
       <p:transition p14:dur="0"/>
     </mc:Choice>
-    <mc:Fallback>
+    <mc:Fallback xmlns="">
       <p:transition/>
     </mc:Fallback>
   </mc:AlternateContent>
@@ -34333,11 +34684,11 @@
   <p:clrMapOvr>
     <a:masterClrMapping/>
   </p:clrMapOvr>
-  <mc:AlternateContent xmlns:mc="http://schemas.openxmlformats.org/markup-compatibility/2006">
-    <mc:Choice xmlns:p14="http://schemas.microsoft.com/office/powerpoint/2010/main" Requires="p14">
+  <mc:AlternateContent xmlns:mc="http://schemas.openxmlformats.org/markup-compatibility/2006" xmlns:p14="http://schemas.microsoft.com/office/powerpoint/2010/main">
+    <mc:Choice Requires="p14">
       <p:transition p14:dur="0"/>
     </mc:Choice>
-    <mc:Fallback>
+    <mc:Fallback xmlns="">
       <p:transition/>
     </mc:Fallback>
   </mc:AlternateContent>
@@ -34696,11 +35047,11 @@
   <p:clrMapOvr>
     <a:masterClrMapping/>
   </p:clrMapOvr>
-  <mc:AlternateContent xmlns:mc="http://schemas.openxmlformats.org/markup-compatibility/2006">
-    <mc:Choice xmlns:p14="http://schemas.microsoft.com/office/powerpoint/2010/main" Requires="p14">
+  <mc:AlternateContent xmlns:mc="http://schemas.openxmlformats.org/markup-compatibility/2006" xmlns:p14="http://schemas.microsoft.com/office/powerpoint/2010/main">
+    <mc:Choice Requires="p14">
       <p:transition p14:dur="0"/>
     </mc:Choice>
-    <mc:Fallback>
+    <mc:Fallback xmlns="">
       <p:transition/>
     </mc:Fallback>
   </mc:AlternateContent>
@@ -35030,11 +35381,11 @@
   <p:clrMapOvr>
     <a:masterClrMapping/>
   </p:clrMapOvr>
-  <mc:AlternateContent xmlns:mc="http://schemas.openxmlformats.org/markup-compatibility/2006">
-    <mc:Choice xmlns:p14="http://schemas.microsoft.com/office/powerpoint/2010/main" Requires="p14">
+  <mc:AlternateContent xmlns:mc="http://schemas.openxmlformats.org/markup-compatibility/2006" xmlns:p14="http://schemas.microsoft.com/office/powerpoint/2010/main">
+    <mc:Choice Requires="p14">
       <p:transition p14:dur="0"/>
     </mc:Choice>
-    <mc:Fallback>
+    <mc:Fallback xmlns="">
       <p:transition/>
     </mc:Fallback>
   </mc:AlternateContent>
@@ -35203,11 +35554,11 @@
   <p:clrMapOvr>
     <a:masterClrMapping/>
   </p:clrMapOvr>
-  <mc:AlternateContent xmlns:mc="http://schemas.openxmlformats.org/markup-compatibility/2006">
-    <mc:Choice xmlns:p14="http://schemas.microsoft.com/office/powerpoint/2010/main" Requires="p14">
+  <mc:AlternateContent xmlns:mc="http://schemas.openxmlformats.org/markup-compatibility/2006" xmlns:p14="http://schemas.microsoft.com/office/powerpoint/2010/main">
+    <mc:Choice Requires="p14">
       <p:transition p14:dur="0"/>
     </mc:Choice>
-    <mc:Fallback>
+    <mc:Fallback xmlns="">
       <p:transition/>
     </mc:Fallback>
   </mc:AlternateContent>
@@ -35328,11 +35679,11 @@
   <p:clrMapOvr>
     <a:masterClrMapping/>
   </p:clrMapOvr>
-  <mc:AlternateContent xmlns:mc="http://schemas.openxmlformats.org/markup-compatibility/2006">
-    <mc:Choice xmlns:p14="http://schemas.microsoft.com/office/powerpoint/2010/main" Requires="p14">
+  <mc:AlternateContent xmlns:mc="http://schemas.openxmlformats.org/markup-compatibility/2006" xmlns:p14="http://schemas.microsoft.com/office/powerpoint/2010/main">
+    <mc:Choice Requires="p14">
       <p:transition p14:dur="0"/>
     </mc:Choice>
-    <mc:Fallback>
+    <mc:Fallback xmlns="">
       <p:transition/>
     </mc:Fallback>
   </mc:AlternateContent>
@@ -35653,11 +36004,11 @@
   <p:clrMapOvr>
     <a:masterClrMapping/>
   </p:clrMapOvr>
-  <mc:AlternateContent xmlns:mc="http://schemas.openxmlformats.org/markup-compatibility/2006">
-    <mc:Choice xmlns:p14="http://schemas.microsoft.com/office/powerpoint/2010/main" Requires="p14">
+  <mc:AlternateContent xmlns:mc="http://schemas.openxmlformats.org/markup-compatibility/2006" xmlns:p14="http://schemas.microsoft.com/office/powerpoint/2010/main">
+    <mc:Choice Requires="p14">
       <p:transition p14:dur="0"/>
     </mc:Choice>
-    <mc:Fallback>
+    <mc:Fallback xmlns="">
       <p:transition/>
     </mc:Fallback>
   </mc:AlternateContent>

</xml_diff>

<commit_message>
Added Survey Slide to all decks
Partial completion of the Azure Virtual Machines Deck as well
</commit_message>
<xml_diff>
--- a/Presentations/03_Windows8AndWindowsAzureMobileServices.pptx
+++ b/Presentations/03_Windows8AndWindowsAzureMobileServices.pptx
@@ -5,10 +5,10 @@
     <p:sldMasterId id="2147484129" r:id="rId1"/>
   </p:sldMasterIdLst>
   <p:notesMasterIdLst>
-    <p:notesMasterId r:id="rId27"/>
+    <p:notesMasterId r:id="rId28"/>
   </p:notesMasterIdLst>
   <p:handoutMasterIdLst>
-    <p:handoutMasterId r:id="rId28"/>
+    <p:handoutMasterId r:id="rId29"/>
   </p:handoutMasterIdLst>
   <p:sldIdLst>
     <p:sldId id="508" r:id="rId2"/>
@@ -34,8 +34,9 @@
     <p:sldId id="567" r:id="rId22"/>
     <p:sldId id="563" r:id="rId23"/>
     <p:sldId id="569" r:id="rId24"/>
-    <p:sldId id="568" r:id="rId25"/>
-    <p:sldId id="516" r:id="rId26"/>
+    <p:sldId id="570" r:id="rId25"/>
+    <p:sldId id="568" r:id="rId26"/>
+    <p:sldId id="516" r:id="rId27"/>
   </p:sldIdLst>
   <p:sldSz cx="12188825" cy="6858000"/>
   <p:notesSz cx="6858000" cy="9144000"/>
@@ -162,6 +163,7 @@
             <p14:sldId id="567"/>
             <p14:sldId id="563"/>
             <p14:sldId id="569"/>
+            <p14:sldId id="570"/>
             <p14:sldId id="568"/>
             <p14:sldId id="516"/>
           </p14:sldIdLst>
@@ -375,7 +377,7 @@
                 <a:latin typeface="Segoe UI" pitchFamily="34" charset="0"/>
               </a:rPr>
               <a:pPr/>
-              <a:t>9/26/2013</a:t>
+              <a:t>9/27/2013</a:t>
             </a:fld>
             <a:endParaRPr lang="en-US" dirty="0">
               <a:solidFill>
@@ -625,7 +627,7 @@
             <a:fld id="{7C3FBCD4-166E-446F-AF18-7D4A0CF9AEF6}" type="datetimeFigureOut">
               <a:rPr lang="en-US" smtClean="0"/>
               <a:pPr/>
-              <a:t>9/26/2013</a:t>
+              <a:t>9/27/2013</a:t>
             </a:fld>
             <a:endParaRPr lang="en-US" dirty="0"/>
           </a:p>
@@ -5600,7 +5602,7 @@
                 </a:solidFill>
               </a:rPr>
               <a:pPr/>
-              <a:t>9/26/2013</a:t>
+              <a:t>9/27/2013</a:t>
             </a:fld>
             <a:endParaRPr lang="en-US">
               <a:solidFill>
@@ -5824,7 +5826,7 @@
                 </a:solidFill>
               </a:rPr>
               <a:pPr/>
-              <a:t>9/26/2013</a:t>
+              <a:t>9/27/2013</a:t>
             </a:fld>
             <a:endParaRPr lang="en-US" dirty="0">
               <a:solidFill>
@@ -6030,7 +6032,7 @@
             <a:fld id="{8B263312-38AA-4E1E-B2B5-0F8F122B24FE}" type="slidenum">
               <a:rPr lang="en-US" smtClean="0"/>
               <a:pPr/>
-              <a:t>25</a:t>
+              <a:t>26</a:t>
             </a:fld>
             <a:endParaRPr lang="en-US" dirty="0"/>
           </a:p>
@@ -7140,7 +7142,7 @@
                 </a:solidFill>
               </a:rPr>
               <a:pPr/>
-              <a:t>9/26/2013</a:t>
+              <a:t>9/27/2013</a:t>
             </a:fld>
             <a:endParaRPr lang="en-US">
               <a:solidFill>
@@ -8696,7 +8698,7 @@
           <p:nvPr/>
         </p:nvPicPr>
         <mc:AlternateContent xmlns:mc="http://schemas.openxmlformats.org/markup-compatibility/2006">
-          <mc:Choice xmlns:ma="http://schemas.microsoft.com/office/mac/drawingml/2008/main" xmlns:mv="urn:schemas-microsoft-com:mac:vml" xmlns="" Requires="ma">
+          <mc:Choice xmlns="" xmlns:mv="urn:schemas-microsoft-com:mac:vml" xmlns:ma="http://schemas.microsoft.com/office/mac/drawingml/2008/main" Requires="ma">
             <p:blipFill>
               <a:blip r:embed="rId3"/>
               <a:srcRect l="19002" t="43683" r="16409" b="45008"/>
@@ -9391,7 +9393,7 @@
           <p:nvPr/>
         </p:nvPicPr>
         <mc:AlternateContent xmlns:mc="http://schemas.openxmlformats.org/markup-compatibility/2006">
-          <mc:Choice xmlns:ma="http://schemas.microsoft.com/office/mac/drawingml/2008/main" xmlns:mv="urn:schemas-microsoft-com:mac:vml" xmlns="" Requires="ma">
+          <mc:Choice xmlns="" xmlns:mv="urn:schemas-microsoft-com:mac:vml" xmlns:ma="http://schemas.microsoft.com/office/mac/drawingml/2008/main" Requires="ma">
             <p:blipFill>
               <a:blip r:embed="rId11"/>
               <a:stretch>
@@ -10964,7 +10966,7 @@
           <p:nvPr/>
         </p:nvPicPr>
         <mc:AlternateContent xmlns:mc="http://schemas.openxmlformats.org/markup-compatibility/2006">
-          <mc:Choice xmlns:ma="http://schemas.microsoft.com/office/mac/drawingml/2008/main" xmlns:mv="urn:schemas-microsoft-com:mac:vml" xmlns="" Requires="ma">
+          <mc:Choice xmlns="" xmlns:mv="urn:schemas-microsoft-com:mac:vml" xmlns:ma="http://schemas.microsoft.com/office/mac/drawingml/2008/main" Requires="ma">
             <p:blipFill>
               <a:blip r:embed="rId11"/>
               <a:stretch>
@@ -11079,7 +11081,7 @@
           <p:nvPr/>
         </p:nvPicPr>
         <mc:AlternateContent xmlns:mc="http://schemas.openxmlformats.org/markup-compatibility/2006">
-          <mc:Choice xmlns:ma="http://schemas.microsoft.com/office/mac/drawingml/2008/main" xmlns:mv="urn:schemas-microsoft-com:mac:vml" xmlns="" Requires="ma">
+          <mc:Choice xmlns="" xmlns:mv="urn:schemas-microsoft-com:mac:vml" xmlns:ma="http://schemas.microsoft.com/office/mac/drawingml/2008/main" Requires="ma">
             <p:blipFill>
               <a:blip r:embed="rId11"/>
               <a:stretch>
@@ -11205,7 +11207,7 @@
           <p:nvPr/>
         </p:nvPicPr>
         <mc:AlternateContent xmlns:mc="http://schemas.openxmlformats.org/markup-compatibility/2006">
-          <mc:Choice xmlns:ma="http://schemas.microsoft.com/office/mac/drawingml/2008/main" xmlns:mv="urn:schemas-microsoft-com:mac:vml" xmlns="" Requires="ma">
+          <mc:Choice xmlns="" xmlns:mv="urn:schemas-microsoft-com:mac:vml" xmlns:ma="http://schemas.microsoft.com/office/mac/drawingml/2008/main" Requires="ma">
             <p:blipFill>
               <a:blip r:embed="rId11"/>
               <a:stretch>
@@ -11380,7 +11382,7 @@
           <p:nvPr/>
         </p:nvPicPr>
         <mc:AlternateContent xmlns:mc="http://schemas.openxmlformats.org/markup-compatibility/2006">
-          <mc:Choice xmlns:ma="http://schemas.microsoft.com/office/mac/drawingml/2008/main" xmlns:mv="urn:schemas-microsoft-com:mac:vml" xmlns="" Requires="ma">
+          <mc:Choice xmlns="" xmlns:mv="urn:schemas-microsoft-com:mac:vml" xmlns:ma="http://schemas.microsoft.com/office/mac/drawingml/2008/main" Requires="ma">
             <p:blipFill>
               <a:blip r:embed="rId11"/>
               <a:stretch>
@@ -11794,7 +11796,7 @@
           <p:nvPr/>
         </p:nvPicPr>
         <mc:AlternateContent xmlns:mc="http://schemas.openxmlformats.org/markup-compatibility/2006">
-          <mc:Choice xmlns:ma="http://schemas.microsoft.com/office/mac/drawingml/2008/main" xmlns:mv="urn:schemas-microsoft-com:mac:vml" xmlns="" Requires="ma">
+          <mc:Choice xmlns="" xmlns:mv="urn:schemas-microsoft-com:mac:vml" xmlns:ma="http://schemas.microsoft.com/office/mac/drawingml/2008/main" Requires="ma">
             <p:blipFill>
               <a:blip r:embed="rId2"/>
               <a:stretch>
@@ -12058,7 +12060,7 @@
           <p:nvPr/>
         </p:nvPicPr>
         <mc:AlternateContent xmlns:mc="http://schemas.openxmlformats.org/markup-compatibility/2006">
-          <mc:Choice xmlns:ma="http://schemas.microsoft.com/office/mac/drawingml/2008/main" xmlns:mv="urn:schemas-microsoft-com:mac:vml" xmlns="" Requires="ma">
+          <mc:Choice xmlns="" xmlns:mv="urn:schemas-microsoft-com:mac:vml" xmlns:ma="http://schemas.microsoft.com/office/mac/drawingml/2008/main" Requires="ma">
             <p:blipFill>
               <a:blip r:embed="rId4"/>
               <a:srcRect l="19002" t="43683" r="16409" b="45008"/>
@@ -12467,7 +12469,7 @@
           <p:nvPr/>
         </p:nvPicPr>
         <mc:AlternateContent xmlns:mc="http://schemas.openxmlformats.org/markup-compatibility/2006">
-          <mc:Choice xmlns:ma="http://schemas.microsoft.com/office/mac/drawingml/2008/main" xmlns:mv="urn:schemas-microsoft-com:mac:vml" xmlns="" Requires="ma">
+          <mc:Choice xmlns="" xmlns:mv="urn:schemas-microsoft-com:mac:vml" xmlns:ma="http://schemas.microsoft.com/office/mac/drawingml/2008/main" Requires="ma">
             <p:blipFill>
               <a:blip r:embed="rId4"/>
               <a:stretch>
@@ -12690,7 +12692,7 @@
           <p:nvPr/>
         </p:nvPicPr>
         <mc:AlternateContent xmlns:mc="http://schemas.openxmlformats.org/markup-compatibility/2006">
-          <mc:Choice xmlns:ma="http://schemas.microsoft.com/office/mac/drawingml/2008/main" xmlns:mv="urn:schemas-microsoft-com:mac:vml" xmlns="" Requires="ma">
+          <mc:Choice xmlns="" xmlns:mv="urn:schemas-microsoft-com:mac:vml" xmlns:ma="http://schemas.microsoft.com/office/mac/drawingml/2008/main" Requires="ma">
             <p:blipFill>
               <a:blip r:embed="rId11"/>
               <a:stretch>
@@ -12971,7 +12973,7 @@
           <p:nvPr/>
         </p:nvPicPr>
         <mc:AlternateContent xmlns:mc="http://schemas.openxmlformats.org/markup-compatibility/2006">
-          <mc:Choice xmlns:ma="http://schemas.microsoft.com/office/mac/drawingml/2008/main" xmlns:mv="urn:schemas-microsoft-com:mac:vml" xmlns="" Requires="ma">
+          <mc:Choice xmlns="" xmlns:mv="urn:schemas-microsoft-com:mac:vml" xmlns:ma="http://schemas.microsoft.com/office/mac/drawingml/2008/main" Requires="ma">
             <p:blipFill>
               <a:blip r:embed="rId11"/>
               <a:stretch>
@@ -13280,7 +13282,7 @@
           <p:nvPr/>
         </p:nvPicPr>
         <mc:AlternateContent xmlns:mc="http://schemas.openxmlformats.org/markup-compatibility/2006">
-          <mc:Choice xmlns:ma="http://schemas.microsoft.com/office/mac/drawingml/2008/main" xmlns:mv="urn:schemas-microsoft-com:mac:vml" xmlns="" Requires="ma">
+          <mc:Choice xmlns="" xmlns:mv="urn:schemas-microsoft-com:mac:vml" xmlns:ma="http://schemas.microsoft.com/office/mac/drawingml/2008/main" Requires="ma">
             <p:blipFill>
               <a:blip r:embed="rId11"/>
               <a:stretch>
@@ -13684,7 +13686,7 @@
           <p:nvPr/>
         </p:nvPicPr>
         <mc:AlternateContent xmlns:mc="http://schemas.openxmlformats.org/markup-compatibility/2006">
-          <mc:Choice xmlns:ma="http://schemas.microsoft.com/office/mac/drawingml/2008/main" xmlns:mv="urn:schemas-microsoft-com:mac:vml" xmlns="" Requires="ma">
+          <mc:Choice xmlns="" xmlns:mv="urn:schemas-microsoft-com:mac:vml" xmlns:ma="http://schemas.microsoft.com/office/mac/drawingml/2008/main" Requires="ma">
             <p:blipFill>
               <a:blip r:embed="rId11"/>
               <a:stretch>
@@ -13998,7 +14000,7 @@
           <p:nvPr/>
         </p:nvPicPr>
         <mc:AlternateContent xmlns:mc="http://schemas.openxmlformats.org/markup-compatibility/2006">
-          <mc:Choice xmlns:ma="http://schemas.microsoft.com/office/mac/drawingml/2008/main" xmlns:mv="urn:schemas-microsoft-com:mac:vml" xmlns="" Requires="ma">
+          <mc:Choice xmlns="" xmlns:mv="urn:schemas-microsoft-com:mac:vml" xmlns:ma="http://schemas.microsoft.com/office/mac/drawingml/2008/main" Requires="ma">
             <p:blipFill>
               <a:blip r:embed="rId11"/>
               <a:stretch>
@@ -15776,7 +15778,7 @@
           <p:nvPr/>
         </p:nvPicPr>
         <mc:AlternateContent xmlns:mc="http://schemas.openxmlformats.org/markup-compatibility/2006">
-          <mc:Choice xmlns:ma="http://schemas.microsoft.com/office/mac/drawingml/2008/main" xmlns:mv="urn:schemas-microsoft-com:mac:vml" xmlns="" Requires="ma">
+          <mc:Choice xmlns="" xmlns:mv="urn:schemas-microsoft-com:mac:vml" xmlns:ma="http://schemas.microsoft.com/office/mac/drawingml/2008/main" Requires="ma">
             <p:blipFill>
               <a:blip r:embed="rId11"/>
               <a:stretch>
@@ -29843,11 +29845,11 @@
   <p:clrMapOvr>
     <a:masterClrMapping/>
   </p:clrMapOvr>
-  <mc:AlternateContent xmlns:mc="http://schemas.openxmlformats.org/markup-compatibility/2006">
-    <mc:Choice xmlns:p14="http://schemas.microsoft.com/office/powerpoint/2010/main" Requires="p14">
+  <mc:AlternateContent xmlns:mc="http://schemas.openxmlformats.org/markup-compatibility/2006" xmlns:p14="http://schemas.microsoft.com/office/powerpoint/2010/main">
+    <mc:Choice Requires="p14">
       <p:transition p14:dur="0"/>
     </mc:Choice>
-    <mc:Fallback>
+    <mc:Fallback xmlns="">
       <p:transition/>
     </mc:Fallback>
   </mc:AlternateContent>
@@ -29862,6 +29864,360 @@
 </file>
 
 <file path=ppt/slides/slide24.xml><?xml version="1.0" encoding="utf-8"?>
+<p:sld xmlns:a="http://schemas.openxmlformats.org/drawingml/2006/main" xmlns:r="http://schemas.openxmlformats.org/officeDocument/2006/relationships" xmlns:p="http://schemas.openxmlformats.org/presentationml/2006/main">
+  <p:cSld>
+    <p:spTree>
+      <p:nvGrpSpPr>
+        <p:cNvPr id="1" name=""/>
+        <p:cNvGrpSpPr/>
+        <p:nvPr/>
+      </p:nvGrpSpPr>
+      <p:grpSpPr>
+        <a:xfrm>
+          <a:off x="0" y="0"/>
+          <a:ext cx="0" cy="0"/>
+          <a:chOff x="0" y="0"/>
+          <a:chExt cx="0" cy="0"/>
+        </a:xfrm>
+      </p:grpSpPr>
+      <p:sp>
+        <p:nvSpPr>
+          <p:cNvPr id="4" name="Title 3"/>
+          <p:cNvSpPr>
+            <a:spLocks noGrp="1"/>
+          </p:cNvSpPr>
+          <p:nvPr>
+            <p:ph type="title"/>
+          </p:nvPr>
+        </p:nvSpPr>
+        <p:spPr/>
+        <p:txBody>
+          <a:bodyPr/>
+          <a:lstStyle/>
+          <a:p>
+            <a:r>
+              <a:rPr lang="en-US" dirty="0"/>
+              <a:t>Take the </a:t>
+            </a:r>
+            <a:r>
+              <a:rPr lang="en-US" dirty="0" err="1"/>
+              <a:t>DevUnleashed</a:t>
+            </a:r>
+            <a:r>
+              <a:rPr lang="en-US" dirty="0"/>
+              <a:t> Windows Azure Survey</a:t>
+            </a:r>
+          </a:p>
+        </p:txBody>
+      </p:sp>
+      <p:sp>
+        <p:nvSpPr>
+          <p:cNvPr id="5" name="Content Placeholder 1"/>
+          <p:cNvSpPr txBox="1">
+            <a:spLocks/>
+          </p:cNvSpPr>
+          <p:nvPr/>
+        </p:nvSpPr>
+        <p:spPr>
+          <a:xfrm>
+            <a:off x="1111418" y="1911982"/>
+            <a:ext cx="5314050" cy="4574571"/>
+          </a:xfrm>
+          <a:prstGeom prst="rect">
+            <a:avLst/>
+          </a:prstGeom>
+        </p:spPr>
+        <p:txBody>
+          <a:bodyPr vert="horz" lIns="121888" tIns="60944" rIns="121888" bIns="60944" rtlCol="0">
+            <a:normAutofit/>
+          </a:bodyPr>
+          <a:lstStyle>
+            <a:lvl1pPr marL="128588" indent="-128588" algn="l" defTabSz="342900" rtl="0" eaLnBrk="1" latinLnBrk="0" hangingPunct="1">
+              <a:spcBef>
+                <a:spcPct val="20000"/>
+              </a:spcBef>
+              <a:buFont typeface="Arial"/>
+              <a:buChar char="•"/>
+              <a:defRPr sz="1500" kern="1200">
+                <a:solidFill>
+                  <a:schemeClr val="tx1">
+                    <a:lumMod val="75000"/>
+                    <a:lumOff val="25000"/>
+                  </a:schemeClr>
+                </a:solidFill>
+                <a:latin typeface="+mn-lt"/>
+                <a:ea typeface="+mn-ea"/>
+                <a:cs typeface="+mn-cs"/>
+              </a:defRPr>
+            </a:lvl1pPr>
+            <a:lvl2pPr marL="557213" indent="-214313" algn="l" defTabSz="342900" rtl="0" eaLnBrk="1" latinLnBrk="0" hangingPunct="1">
+              <a:spcBef>
+                <a:spcPct val="20000"/>
+              </a:spcBef>
+              <a:buFont typeface="Arial"/>
+              <a:buChar char="–"/>
+              <a:defRPr sz="1500" kern="1200">
+                <a:solidFill>
+                  <a:schemeClr val="tx1">
+                    <a:lumMod val="75000"/>
+                    <a:lumOff val="25000"/>
+                  </a:schemeClr>
+                </a:solidFill>
+                <a:latin typeface="+mn-lt"/>
+                <a:ea typeface="+mn-ea"/>
+                <a:cs typeface="+mn-cs"/>
+              </a:defRPr>
+            </a:lvl2pPr>
+            <a:lvl3pPr marL="857250" indent="-171450" algn="l" defTabSz="342900" rtl="0" eaLnBrk="1" latinLnBrk="0" hangingPunct="1">
+              <a:spcBef>
+                <a:spcPct val="20000"/>
+              </a:spcBef>
+              <a:buFont typeface="Arial"/>
+              <a:buChar char="•"/>
+              <a:defRPr sz="1500" kern="1200">
+                <a:solidFill>
+                  <a:schemeClr val="tx1">
+                    <a:lumMod val="75000"/>
+                    <a:lumOff val="25000"/>
+                  </a:schemeClr>
+                </a:solidFill>
+                <a:latin typeface="+mn-lt"/>
+                <a:ea typeface="+mn-ea"/>
+                <a:cs typeface="+mn-cs"/>
+              </a:defRPr>
+            </a:lvl3pPr>
+            <a:lvl4pPr marL="1200150" indent="-171450" algn="l" defTabSz="342900" rtl="0" eaLnBrk="1" latinLnBrk="0" hangingPunct="1">
+              <a:spcBef>
+                <a:spcPct val="20000"/>
+              </a:spcBef>
+              <a:buFont typeface="Arial"/>
+              <a:buChar char="–"/>
+              <a:defRPr sz="1500" kern="1200">
+                <a:solidFill>
+                  <a:schemeClr val="tx1">
+                    <a:lumMod val="75000"/>
+                    <a:lumOff val="25000"/>
+                  </a:schemeClr>
+                </a:solidFill>
+                <a:latin typeface="+mn-lt"/>
+                <a:ea typeface="+mn-ea"/>
+                <a:cs typeface="+mn-cs"/>
+              </a:defRPr>
+            </a:lvl4pPr>
+            <a:lvl5pPr marL="1543050" indent="-171450" algn="l" defTabSz="342900" rtl="0" eaLnBrk="1" latinLnBrk="0" hangingPunct="1">
+              <a:spcBef>
+                <a:spcPct val="20000"/>
+              </a:spcBef>
+              <a:buFont typeface="Arial"/>
+              <a:buChar char="»"/>
+              <a:defRPr sz="1500" kern="1200">
+                <a:solidFill>
+                  <a:schemeClr val="tx1">
+                    <a:lumMod val="75000"/>
+                    <a:lumOff val="25000"/>
+                  </a:schemeClr>
+                </a:solidFill>
+                <a:latin typeface="+mn-lt"/>
+                <a:ea typeface="+mn-ea"/>
+                <a:cs typeface="+mn-cs"/>
+              </a:defRPr>
+            </a:lvl5pPr>
+            <a:lvl6pPr marL="1885950" indent="-171450" algn="l" defTabSz="342900" rtl="0" eaLnBrk="1" latinLnBrk="0" hangingPunct="1">
+              <a:spcBef>
+                <a:spcPct val="20000"/>
+              </a:spcBef>
+              <a:buFont typeface="Arial"/>
+              <a:buChar char="•"/>
+              <a:defRPr sz="1500" kern="1200">
+                <a:solidFill>
+                  <a:schemeClr val="tx1"/>
+                </a:solidFill>
+                <a:latin typeface="+mn-lt"/>
+                <a:ea typeface="+mn-ea"/>
+                <a:cs typeface="+mn-cs"/>
+              </a:defRPr>
+            </a:lvl6pPr>
+            <a:lvl7pPr marL="2228850" indent="-171450" algn="l" defTabSz="342900" rtl="0" eaLnBrk="1" latinLnBrk="0" hangingPunct="1">
+              <a:spcBef>
+                <a:spcPct val="20000"/>
+              </a:spcBef>
+              <a:buFont typeface="Arial"/>
+              <a:buChar char="•"/>
+              <a:defRPr sz="1500" kern="1200">
+                <a:solidFill>
+                  <a:schemeClr val="tx1"/>
+                </a:solidFill>
+                <a:latin typeface="+mn-lt"/>
+                <a:ea typeface="+mn-ea"/>
+                <a:cs typeface="+mn-cs"/>
+              </a:defRPr>
+            </a:lvl7pPr>
+            <a:lvl8pPr marL="2571750" indent="-171450" algn="l" defTabSz="342900" rtl="0" eaLnBrk="1" latinLnBrk="0" hangingPunct="1">
+              <a:spcBef>
+                <a:spcPct val="20000"/>
+              </a:spcBef>
+              <a:buFont typeface="Arial"/>
+              <a:buChar char="•"/>
+              <a:defRPr sz="1500" kern="1200">
+                <a:solidFill>
+                  <a:schemeClr val="tx1"/>
+                </a:solidFill>
+                <a:latin typeface="+mn-lt"/>
+                <a:ea typeface="+mn-ea"/>
+                <a:cs typeface="+mn-cs"/>
+              </a:defRPr>
+            </a:lvl8pPr>
+            <a:lvl9pPr marL="2914650" indent="-171450" algn="l" defTabSz="342900" rtl="0" eaLnBrk="1" latinLnBrk="0" hangingPunct="1">
+              <a:spcBef>
+                <a:spcPct val="20000"/>
+              </a:spcBef>
+              <a:buFont typeface="Arial"/>
+              <a:buChar char="•"/>
+              <a:defRPr sz="1500" kern="1200">
+                <a:solidFill>
+                  <a:schemeClr val="tx1"/>
+                </a:solidFill>
+                <a:latin typeface="+mn-lt"/>
+                <a:ea typeface="+mn-ea"/>
+                <a:cs typeface="+mn-cs"/>
+              </a:defRPr>
+            </a:lvl9pPr>
+          </a:lstStyle>
+          <a:p>
+            <a:pPr marL="0" indent="0">
+              <a:buNone/>
+            </a:pPr>
+            <a:r>
+              <a:rPr lang="en-US" sz="3199" dirty="0"/>
+              <a:t>Your feedback, helps us make these events available to your community, please fill it out sometime today. </a:t>
+            </a:r>
+            <a:endParaRPr lang="en-US" sz="2000" dirty="0"/>
+          </a:p>
+          <a:p>
+            <a:endParaRPr lang="en-US" sz="2000" dirty="0"/>
+          </a:p>
+          <a:p>
+            <a:endParaRPr lang="en-US" sz="2000" dirty="0"/>
+          </a:p>
+        </p:txBody>
+      </p:sp>
+      <p:pic>
+        <p:nvPicPr>
+          <p:cNvPr id="7" name="Picture 6"/>
+          <p:cNvPicPr>
+            <a:picLocks noChangeAspect="1"/>
+          </p:cNvPicPr>
+          <p:nvPr/>
+        </p:nvPicPr>
+        <p:blipFill>
+          <a:blip r:embed="rId2"/>
+          <a:stretch>
+            <a:fillRect/>
+          </a:stretch>
+        </p:blipFill>
+        <p:spPr>
+          <a:xfrm>
+            <a:off x="2700097" y="3998692"/>
+            <a:ext cx="2136693" cy="2103820"/>
+          </a:xfrm>
+          <a:prstGeom prst="rect">
+            <a:avLst/>
+          </a:prstGeom>
+        </p:spPr>
+      </p:pic>
+      <p:pic>
+        <p:nvPicPr>
+          <p:cNvPr id="8" name="Picture Placeholder 5"/>
+          <p:cNvPicPr>
+            <a:picLocks noGrp="1" noChangeAspect="1"/>
+          </p:cNvPicPr>
+          <p:nvPr>
+            <p:ph type="pic" sz="quarter" idx="12"/>
+          </p:nvPr>
+        </p:nvPicPr>
+        <p:blipFill>
+          <a:blip r:embed="rId3"/>
+          <a:srcRect l="8891" r="8891"/>
+          <a:stretch>
+            <a:fillRect/>
+          </a:stretch>
+        </p:blipFill>
+        <p:spPr>
+          <a:prstGeom prst="rect">
+            <a:avLst/>
+          </a:prstGeom>
+          <a:solidFill>
+            <a:srgbClr val="282828"/>
+          </a:solidFill>
+          <a:effectLst>
+            <a:innerShdw blurRad="101600" dist="25400" dir="13500000">
+              <a:srgbClr val="000000">
+                <a:alpha val="76000"/>
+              </a:srgbClr>
+            </a:innerShdw>
+          </a:effectLst>
+        </p:spPr>
+      </p:pic>
+      <p:sp>
+        <p:nvSpPr>
+          <p:cNvPr id="2" name="Rectangle 1"/>
+          <p:cNvSpPr/>
+          <p:nvPr/>
+        </p:nvSpPr>
+        <p:spPr>
+          <a:xfrm>
+            <a:off x="2461402" y="6137761"/>
+            <a:ext cx="7928132" cy="584775"/>
+          </a:xfrm>
+          <a:prstGeom prst="rect">
+            <a:avLst/>
+          </a:prstGeom>
+        </p:spPr>
+        <p:txBody>
+          <a:bodyPr wrap="none">
+            <a:spAutoFit/>
+          </a:bodyPr>
+          <a:lstStyle/>
+          <a:p>
+            <a:r>
+              <a:rPr lang="en-US" sz="3200" dirty="0">
+                <a:hlinkClick r:id="rId4"/>
+              </a:rPr>
+              <a:t>www.surveymonkey.com/s/azureunleashed</a:t>
+            </a:r>
+            <a:endParaRPr lang="en-US" sz="3200" dirty="0"/>
+          </a:p>
+        </p:txBody>
+      </p:sp>
+    </p:spTree>
+    <p:extLst>
+      <p:ext uri="{BB962C8B-B14F-4D97-AF65-F5344CB8AC3E}">
+        <p14:creationId xmlns:p14="http://schemas.microsoft.com/office/powerpoint/2010/main" val="3410094804"/>
+      </p:ext>
+    </p:extLst>
+  </p:cSld>
+  <p:clrMapOvr>
+    <a:masterClrMapping/>
+  </p:clrMapOvr>
+  <mc:AlternateContent xmlns:mc="http://schemas.openxmlformats.org/markup-compatibility/2006" xmlns:p14="http://schemas.microsoft.com/office/powerpoint/2010/main">
+    <mc:Choice Requires="p14">
+      <p:transition p14:dur="0"/>
+    </mc:Choice>
+    <mc:Fallback xmlns="">
+      <p:transition/>
+    </mc:Fallback>
+  </mc:AlternateContent>
+  <p:timing>
+    <p:tnLst>
+      <p:par>
+        <p:cTn id="1" dur="indefinite" restart="never" nodeType="tmRoot"/>
+      </p:par>
+    </p:tnLst>
+  </p:timing>
+</p:sld>
+</file>
+
+<file path=ppt/slides/slide25.xml><?xml version="1.0" encoding="utf-8"?>
 <p:sld xmlns:a="http://schemas.openxmlformats.org/drawingml/2006/main" xmlns:r="http://schemas.openxmlformats.org/officeDocument/2006/relationships" xmlns:p="http://schemas.openxmlformats.org/presentationml/2006/main">
   <p:cSld>
     <p:spTree>
@@ -30030,7 +30386,7 @@
 </p:sld>
 </file>
 
-<file path=ppt/slides/slide25.xml><?xml version="1.0" encoding="utf-8"?>
+<file path=ppt/slides/slide26.xml><?xml version="1.0" encoding="utf-8"?>
 <p:sld xmlns:a="http://schemas.openxmlformats.org/drawingml/2006/main" xmlns:r="http://schemas.openxmlformats.org/officeDocument/2006/relationships" xmlns:p="http://schemas.openxmlformats.org/presentationml/2006/main">
   <p:cSld>
     <p:spTree>

</xml_diff>

<commit_message>
Updated decks for recordings.
</commit_message>
<xml_diff>
--- a/Presentations/03_Windows8AndWindowsAzureMobileServices.pptx
+++ b/Presentations/03_Windows8AndWindowsAzureMobileServices.pptx
@@ -377,7 +377,7 @@
                 <a:latin typeface="Segoe UI" pitchFamily="34" charset="0"/>
               </a:rPr>
               <a:pPr/>
-              <a:t>9/27/2013</a:t>
+              <a:t>10/3/2013</a:t>
             </a:fld>
             <a:endParaRPr lang="en-US" dirty="0">
               <a:solidFill>
@@ -627,7 +627,7 @@
             <a:fld id="{7C3FBCD4-166E-446F-AF18-7D4A0CF9AEF6}" type="datetimeFigureOut">
               <a:rPr lang="en-US" smtClean="0"/>
               <a:pPr/>
-              <a:t>9/27/2013</a:t>
+              <a:t>10/3/2013</a:t>
             </a:fld>
             <a:endParaRPr lang="en-US" dirty="0"/>
           </a:p>
@@ -1066,15 +1066,19 @@
               <a:rPr lang="en-US" dirty="0" smtClean="0">
                 <a:hlinkClick r:id="rId3"/>
               </a:rPr>
-              <a:t>http://go.microsoft.com/fwlink/?LinkID=267130&amp;clcid=0x409</a:t>
-            </a:r>
-            <a:r>
-              <a:rPr lang="en-US" dirty="0" smtClean="0"/>
+              <a:t>http://go.microsoft.com/fwlink/?</a:t>
+            </a:r>
+            <a:r>
+              <a:rPr lang="en-US" smtClean="0">
+                <a:hlinkClick r:id="rId3"/>
+              </a:rPr>
+              <a:t>LinkID=267130&amp;clcid=0x409</a:t>
+            </a:r>
+            <a:r>
+              <a:rPr lang="en-US" smtClean="0"/>
               <a:t> </a:t>
             </a:r>
-          </a:p>
-          <a:p>
-            <a:endParaRPr lang="en-US" b="0" dirty="0"/>
+            <a:endParaRPr lang="en-US" dirty="0" smtClean="0"/>
           </a:p>
         </p:txBody>
       </p:sp>
@@ -3887,7 +3891,7 @@
                 <a:ea typeface="+mn-ea"/>
                 <a:cs typeface="+mn-cs"/>
               </a:rPr>
-              <a:t>Demo script with full code snippets available in</a:t>
+              <a:t>Create</a:t>
             </a:r>
             <a:r>
               <a:rPr lang="en-US" sz="900" kern="1200" baseline="0" dirty="0" smtClean="0">
@@ -3899,11 +3903,191 @@
                 <a:ea typeface="+mn-ea"/>
                 <a:cs typeface="+mn-cs"/>
               </a:rPr>
-              <a:t> link on slide 2</a:t>
-            </a:r>
-            <a:endParaRPr lang="en-US" dirty="0" smtClean="0">
+              <a:t> a scheduled job named </a:t>
+            </a:r>
+            <a:r>
+              <a:rPr lang="en-US" sz="900" kern="1200" baseline="0" dirty="0" err="1" smtClean="0">
+                <a:solidFill>
+                  <a:schemeClr val="tx1"/>
+                </a:solidFill>
+                <a:effectLst/>
+                <a:latin typeface="Segoe UI" pitchFamily="34" charset="0"/>
+                <a:ea typeface="+mn-ea"/>
+                <a:cs typeface="+mn-cs"/>
+              </a:rPr>
+              <a:t>deleteall</a:t>
+            </a:r>
+            <a:r>
+              <a:rPr lang="en-US" sz="900" kern="1200" baseline="0" dirty="0" smtClean="0">
+                <a:solidFill>
+                  <a:schemeClr val="tx1"/>
+                </a:solidFill>
+                <a:effectLst/>
+                <a:latin typeface="Segoe UI" pitchFamily="34" charset="0"/>
+                <a:ea typeface="+mn-ea"/>
+                <a:cs typeface="+mn-cs"/>
+              </a:rPr>
+              <a:t> modify the script to the following:</a:t>
+            </a:r>
+          </a:p>
+          <a:p>
+            <a:endParaRPr lang="en-US" sz="900" kern="1200" baseline="0" dirty="0" smtClean="0">
+              <a:solidFill>
+                <a:schemeClr val="tx1"/>
+              </a:solidFill>
               <a:effectLst/>
+              <a:latin typeface="Segoe UI" pitchFamily="34" charset="0"/>
+              <a:ea typeface="+mn-ea"/>
+              <a:cs typeface="+mn-cs"/>
             </a:endParaRPr>
+          </a:p>
+          <a:p>
+            <a:r>
+              <a:rPr lang="en-US" dirty="0" smtClean="0">
+                <a:effectLst/>
+              </a:rPr>
+              <a:t>function </a:t>
+            </a:r>
+            <a:r>
+              <a:rPr lang="en-US" dirty="0" err="1" smtClean="0">
+                <a:effectLst/>
+              </a:rPr>
+              <a:t>deleteall</a:t>
+            </a:r>
+            <a:r>
+              <a:rPr lang="en-US" dirty="0" smtClean="0">
+                <a:effectLst/>
+              </a:rPr>
+              <a:t>() {</a:t>
+            </a:r>
+          </a:p>
+          <a:p>
+            <a:r>
+              <a:rPr lang="en-US" dirty="0" smtClean="0">
+                <a:effectLst/>
+              </a:rPr>
+              <a:t>    </a:t>
+            </a:r>
+            <a:r>
+              <a:rPr lang="en-US" dirty="0" err="1" smtClean="0">
+                <a:effectLst/>
+              </a:rPr>
+              <a:t>var</a:t>
+            </a:r>
+            <a:r>
+              <a:rPr lang="en-US" dirty="0" smtClean="0">
+                <a:effectLst/>
+              </a:rPr>
+              <a:t> </a:t>
+            </a:r>
+            <a:r>
+              <a:rPr lang="en-US" dirty="0" err="1" smtClean="0">
+                <a:effectLst/>
+              </a:rPr>
+              <a:t>sql</a:t>
+            </a:r>
+            <a:r>
+              <a:rPr lang="en-US" dirty="0" smtClean="0">
+                <a:effectLst/>
+              </a:rPr>
+              <a:t> = "DELETE FROM </a:t>
+            </a:r>
+            <a:r>
+              <a:rPr lang="en-US" dirty="0" err="1" smtClean="0">
+                <a:effectLst/>
+              </a:rPr>
+              <a:t>todoitem</a:t>
+            </a:r>
+            <a:r>
+              <a:rPr lang="en-US" dirty="0" smtClean="0">
+                <a:effectLst/>
+              </a:rPr>
+              <a:t>";</a:t>
+            </a:r>
+          </a:p>
+          <a:p>
+            <a:r>
+              <a:rPr lang="en-US" dirty="0" smtClean="0">
+                <a:effectLst/>
+              </a:rPr>
+              <a:t>    </a:t>
+            </a:r>
+            <a:r>
+              <a:rPr lang="en-US" dirty="0" err="1" smtClean="0">
+                <a:effectLst/>
+              </a:rPr>
+              <a:t>mssql.query</a:t>
+            </a:r>
+            <a:r>
+              <a:rPr lang="en-US" dirty="0" smtClean="0">
+                <a:effectLst/>
+              </a:rPr>
+              <a:t>(</a:t>
+            </a:r>
+            <a:r>
+              <a:rPr lang="en-US" dirty="0" err="1" smtClean="0">
+                <a:effectLst/>
+              </a:rPr>
+              <a:t>sql</a:t>
+            </a:r>
+            <a:r>
+              <a:rPr lang="en-US" dirty="0" smtClean="0">
+                <a:effectLst/>
+              </a:rPr>
+              <a:t>, {</a:t>
+            </a:r>
+          </a:p>
+          <a:p>
+            <a:r>
+              <a:rPr lang="en-US" dirty="0" smtClean="0">
+                <a:effectLst/>
+              </a:rPr>
+              <a:t>        success: function(results) {            </a:t>
+            </a:r>
+          </a:p>
+          <a:p>
+            <a:r>
+              <a:rPr lang="en-US" dirty="0" smtClean="0">
+                <a:effectLst/>
+              </a:rPr>
+              <a:t>            console.log('all </a:t>
+            </a:r>
+            <a:r>
+              <a:rPr lang="en-US" dirty="0" err="1" smtClean="0">
+                <a:effectLst/>
+              </a:rPr>
+              <a:t>todos</a:t>
+            </a:r>
+            <a:r>
+              <a:rPr lang="en-US" dirty="0" smtClean="0">
+                <a:effectLst/>
+              </a:rPr>
+              <a:t> deleted'); </a:t>
+            </a:r>
+          </a:p>
+          <a:p>
+            <a:r>
+              <a:rPr lang="en-US" dirty="0" smtClean="0">
+                <a:effectLst/>
+              </a:rPr>
+              <a:t>        }</a:t>
+            </a:r>
+          </a:p>
+          <a:p>
+            <a:r>
+              <a:rPr lang="en-US" dirty="0" smtClean="0">
+                <a:effectLst/>
+              </a:rPr>
+              <a:t>    })</a:t>
+            </a:r>
+          </a:p>
+          <a:p>
+            <a:r>
+              <a:rPr lang="en-US" dirty="0" smtClean="0">
+                <a:effectLst/>
+              </a:rPr>
+              <a:t>}</a:t>
+            </a:r>
           </a:p>
           <a:p>
             <a:endParaRPr lang="en-US" i="0" dirty="0"/>
@@ -5602,7 +5786,7 @@
                 </a:solidFill>
               </a:rPr>
               <a:pPr/>
-              <a:t>9/27/2013</a:t>
+              <a:t>10/3/2013</a:t>
             </a:fld>
             <a:endParaRPr lang="en-US">
               <a:solidFill>
@@ -5826,7 +6010,7 @@
                 </a:solidFill>
               </a:rPr>
               <a:pPr/>
-              <a:t>9/27/2013</a:t>
+              <a:t>10/3/2013</a:t>
             </a:fld>
             <a:endParaRPr lang="en-US" dirty="0">
               <a:solidFill>
@@ -7142,7 +7326,7 @@
                 </a:solidFill>
               </a:rPr>
               <a:pPr/>
-              <a:t>9/27/2013</a:t>
+              <a:t>10/3/2013</a:t>
             </a:fld>
             <a:endParaRPr lang="en-US">
               <a:solidFill>
@@ -24250,14 +24434,7 @@
           <a:p>
             <a:r>
               <a:rPr lang="en-US" sz="4000" dirty="0" smtClean="0"/>
-              <a:t>Poll Twitter and </a:t>
-            </a:r>
-            <a:br>
-              <a:rPr lang="en-US" sz="4000" dirty="0" smtClean="0"/>
-            </a:br>
-            <a:r>
-              <a:rPr lang="en-US" sz="4000" dirty="0" smtClean="0"/>
-              <a:t>send notification on a schedule</a:t>
+              <a:t>Purge data on a schedule</a:t>
             </a:r>
             <a:endParaRPr lang="en-US" sz="6700" dirty="0"/>
           </a:p>
@@ -29771,7 +29948,7 @@
 </file>
 
 <file path=ppt/slides/slide23.xml><?xml version="1.0" encoding="utf-8"?>
-<p:sld xmlns:a="http://schemas.openxmlformats.org/drawingml/2006/main" xmlns:r="http://schemas.openxmlformats.org/officeDocument/2006/relationships" xmlns:p="http://schemas.openxmlformats.org/presentationml/2006/main">
+<p:sld xmlns:a="http://schemas.openxmlformats.org/drawingml/2006/main" xmlns:r="http://schemas.openxmlformats.org/officeDocument/2006/relationships" xmlns:p="http://schemas.openxmlformats.org/presentationml/2006/main" show="0">
   <p:cSld>
     <p:spTree>
       <p:nvGrpSpPr>

</xml_diff>